<commit_message>
update the sixth week ppt
</commit_message>
<xml_diff>
--- a/linzepei/slides.pptx
+++ b/linzepei/slides.pptx
@@ -4,19 +4,19 @@
   <p:sldMasterIdLst>
     <p:sldMasterId id="2147483648" r:id="rId1"/>
   </p:sldMasterIdLst>
+  <p:notesMasterIdLst>
+    <p:notesMasterId r:id="rId11"/>
+  </p:notesMasterIdLst>
   <p:sldIdLst>
     <p:sldId id="256" r:id="rId2"/>
     <p:sldId id="258" r:id="rId3"/>
-    <p:sldId id="261" r:id="rId4"/>
-    <p:sldId id="260" r:id="rId5"/>
-    <p:sldId id="262" r:id="rId6"/>
-    <p:sldId id="259" r:id="rId7"/>
-    <p:sldId id="263" r:id="rId8"/>
-    <p:sldId id="264" r:id="rId9"/>
-    <p:sldId id="265" r:id="rId10"/>
-    <p:sldId id="266" r:id="rId11"/>
-    <p:sldId id="267" r:id="rId12"/>
-    <p:sldId id="268" r:id="rId13"/>
+    <p:sldId id="260" r:id="rId4"/>
+    <p:sldId id="262" r:id="rId5"/>
+    <p:sldId id="259" r:id="rId6"/>
+    <p:sldId id="263" r:id="rId7"/>
+    <p:sldId id="264" r:id="rId8"/>
+    <p:sldId id="265" r:id="rId9"/>
+    <p:sldId id="269" r:id="rId10"/>
   </p:sldIdLst>
   <p:sldSz cx="12192000" cy="6858000"/>
   <p:notesSz cx="6858000" cy="9144000"/>
@@ -121,6 +121,439 @@
     </p:ext>
   </p:extLst>
 </p:presentation>
+</file>
+
+<file path=ppt/notesMasters/notesMaster1.xml><?xml version="1.0" encoding="utf-8"?>
+<p:notesMaster xmlns:a="http://schemas.openxmlformats.org/drawingml/2006/main" xmlns:r="http://schemas.openxmlformats.org/officeDocument/2006/relationships" xmlns:p="http://schemas.openxmlformats.org/presentationml/2006/main">
+  <p:cSld>
+    <p:bg>
+      <p:bgRef idx="1001">
+        <a:schemeClr val="bg1"/>
+      </p:bgRef>
+    </p:bg>
+    <p:spTree>
+      <p:nvGrpSpPr>
+        <p:cNvPr id="1" name=""/>
+        <p:cNvGrpSpPr/>
+        <p:nvPr/>
+      </p:nvGrpSpPr>
+      <p:grpSpPr>
+        <a:xfrm>
+          <a:off x="0" y="0"/>
+          <a:ext cx="0" cy="0"/>
+          <a:chOff x="0" y="0"/>
+          <a:chExt cx="0" cy="0"/>
+        </a:xfrm>
+      </p:grpSpPr>
+      <p:sp>
+        <p:nvSpPr>
+          <p:cNvPr id="2" name="页眉占位符 1"/>
+          <p:cNvSpPr>
+            <a:spLocks noGrp="1"/>
+          </p:cNvSpPr>
+          <p:nvPr>
+            <p:ph type="hdr" sz="quarter"/>
+          </p:nvPr>
+        </p:nvSpPr>
+        <p:spPr>
+          <a:xfrm>
+            <a:off x="0" y="0"/>
+            <a:ext cx="2971800" cy="458788"/>
+          </a:xfrm>
+          <a:prstGeom prst="rect">
+            <a:avLst/>
+          </a:prstGeom>
+        </p:spPr>
+        <p:txBody>
+          <a:bodyPr vert="horz" lIns="91440" tIns="45720" rIns="91440" bIns="45720" rtlCol="0"/>
+          <a:lstStyle>
+            <a:lvl1pPr algn="l">
+              <a:defRPr sz="1200"/>
+            </a:lvl1pPr>
+          </a:lstStyle>
+          <a:p>
+            <a:endParaRPr lang="zh-CN" altLang="en-US"/>
+          </a:p>
+        </p:txBody>
+      </p:sp>
+      <p:sp>
+        <p:nvSpPr>
+          <p:cNvPr id="3" name="日期占位符 2"/>
+          <p:cNvSpPr>
+            <a:spLocks noGrp="1"/>
+          </p:cNvSpPr>
+          <p:nvPr>
+            <p:ph type="dt" idx="1"/>
+          </p:nvPr>
+        </p:nvSpPr>
+        <p:spPr>
+          <a:xfrm>
+            <a:off x="3884613" y="0"/>
+            <a:ext cx="2971800" cy="458788"/>
+          </a:xfrm>
+          <a:prstGeom prst="rect">
+            <a:avLst/>
+          </a:prstGeom>
+        </p:spPr>
+        <p:txBody>
+          <a:bodyPr vert="horz" lIns="91440" tIns="45720" rIns="91440" bIns="45720" rtlCol="0"/>
+          <a:lstStyle>
+            <a:lvl1pPr algn="r">
+              <a:defRPr sz="1200"/>
+            </a:lvl1pPr>
+          </a:lstStyle>
+          <a:p>
+            <a:fld id="{7B4959FB-ADBC-42C3-AB79-FCD816CABA1A}" type="datetimeFigureOut">
+              <a:rPr lang="zh-CN" altLang="en-US" smtClean="0"/>
+              <a:t>2019/4/4</a:t>
+            </a:fld>
+            <a:endParaRPr lang="zh-CN" altLang="en-US"/>
+          </a:p>
+        </p:txBody>
+      </p:sp>
+      <p:sp>
+        <p:nvSpPr>
+          <p:cNvPr id="4" name="幻灯片图像占位符 3"/>
+          <p:cNvSpPr>
+            <a:spLocks noGrp="1" noRot="1" noChangeAspect="1"/>
+          </p:cNvSpPr>
+          <p:nvPr>
+            <p:ph type="sldImg" idx="2"/>
+          </p:nvPr>
+        </p:nvSpPr>
+        <p:spPr>
+          <a:xfrm>
+            <a:off x="685800" y="1143000"/>
+            <a:ext cx="5486400" cy="3086100"/>
+          </a:xfrm>
+          <a:prstGeom prst="rect">
+            <a:avLst/>
+          </a:prstGeom>
+          <a:noFill/>
+          <a:ln w="12700">
+            <a:solidFill>
+              <a:prstClr val="black"/>
+            </a:solidFill>
+          </a:ln>
+        </p:spPr>
+        <p:txBody>
+          <a:bodyPr vert="horz" lIns="91440" tIns="45720" rIns="91440" bIns="45720" rtlCol="0" anchor="ctr"/>
+          <a:lstStyle/>
+          <a:p>
+            <a:endParaRPr lang="zh-CN" altLang="en-US"/>
+          </a:p>
+        </p:txBody>
+      </p:sp>
+      <p:sp>
+        <p:nvSpPr>
+          <p:cNvPr id="5" name="备注占位符 4"/>
+          <p:cNvSpPr>
+            <a:spLocks noGrp="1"/>
+          </p:cNvSpPr>
+          <p:nvPr>
+            <p:ph type="body" sz="quarter" idx="3"/>
+          </p:nvPr>
+        </p:nvSpPr>
+        <p:spPr>
+          <a:xfrm>
+            <a:off x="685800" y="4400550"/>
+            <a:ext cx="5486400" cy="3600450"/>
+          </a:xfrm>
+          <a:prstGeom prst="rect">
+            <a:avLst/>
+          </a:prstGeom>
+        </p:spPr>
+        <p:txBody>
+          <a:bodyPr vert="horz" lIns="91440" tIns="45720" rIns="91440" bIns="45720" rtlCol="0"/>
+          <a:lstStyle/>
+          <a:p>
+            <a:pPr lvl="0"/>
+            <a:r>
+              <a:rPr lang="zh-CN" altLang="en-US"/>
+              <a:t>单击此处编辑母版文本样式</a:t>
+            </a:r>
+          </a:p>
+          <a:p>
+            <a:pPr lvl="1"/>
+            <a:r>
+              <a:rPr lang="zh-CN" altLang="en-US"/>
+              <a:t>二级</a:t>
+            </a:r>
+          </a:p>
+          <a:p>
+            <a:pPr lvl="2"/>
+            <a:r>
+              <a:rPr lang="zh-CN" altLang="en-US"/>
+              <a:t>三级</a:t>
+            </a:r>
+          </a:p>
+          <a:p>
+            <a:pPr lvl="3"/>
+            <a:r>
+              <a:rPr lang="zh-CN" altLang="en-US"/>
+              <a:t>四级</a:t>
+            </a:r>
+          </a:p>
+          <a:p>
+            <a:pPr lvl="4"/>
+            <a:r>
+              <a:rPr lang="zh-CN" altLang="en-US"/>
+              <a:t>五级</a:t>
+            </a:r>
+          </a:p>
+        </p:txBody>
+      </p:sp>
+      <p:sp>
+        <p:nvSpPr>
+          <p:cNvPr id="6" name="页脚占位符 5"/>
+          <p:cNvSpPr>
+            <a:spLocks noGrp="1"/>
+          </p:cNvSpPr>
+          <p:nvPr>
+            <p:ph type="ftr" sz="quarter" idx="4"/>
+          </p:nvPr>
+        </p:nvSpPr>
+        <p:spPr>
+          <a:xfrm>
+            <a:off x="0" y="8685213"/>
+            <a:ext cx="2971800" cy="458787"/>
+          </a:xfrm>
+          <a:prstGeom prst="rect">
+            <a:avLst/>
+          </a:prstGeom>
+        </p:spPr>
+        <p:txBody>
+          <a:bodyPr vert="horz" lIns="91440" tIns="45720" rIns="91440" bIns="45720" rtlCol="0" anchor="b"/>
+          <a:lstStyle>
+            <a:lvl1pPr algn="l">
+              <a:defRPr sz="1200"/>
+            </a:lvl1pPr>
+          </a:lstStyle>
+          <a:p>
+            <a:endParaRPr lang="zh-CN" altLang="en-US"/>
+          </a:p>
+        </p:txBody>
+      </p:sp>
+      <p:sp>
+        <p:nvSpPr>
+          <p:cNvPr id="7" name="灯片编号占位符 6"/>
+          <p:cNvSpPr>
+            <a:spLocks noGrp="1"/>
+          </p:cNvSpPr>
+          <p:nvPr>
+            <p:ph type="sldNum" sz="quarter" idx="5"/>
+          </p:nvPr>
+        </p:nvSpPr>
+        <p:spPr>
+          <a:xfrm>
+            <a:off x="3884613" y="8685213"/>
+            <a:ext cx="2971800" cy="458787"/>
+          </a:xfrm>
+          <a:prstGeom prst="rect">
+            <a:avLst/>
+          </a:prstGeom>
+        </p:spPr>
+        <p:txBody>
+          <a:bodyPr vert="horz" lIns="91440" tIns="45720" rIns="91440" bIns="45720" rtlCol="0" anchor="b"/>
+          <a:lstStyle>
+            <a:lvl1pPr algn="r">
+              <a:defRPr sz="1200"/>
+            </a:lvl1pPr>
+          </a:lstStyle>
+          <a:p>
+            <a:fld id="{387E59EE-C88D-4491-BDE4-DAC2252FA3CC}" type="slidenum">
+              <a:rPr lang="zh-CN" altLang="en-US" smtClean="0"/>
+              <a:t>‹#›</a:t>
+            </a:fld>
+            <a:endParaRPr lang="zh-CN" altLang="en-US"/>
+          </a:p>
+        </p:txBody>
+      </p:sp>
+    </p:spTree>
+    <p:extLst>
+      <p:ext uri="{BB962C8B-B14F-4D97-AF65-F5344CB8AC3E}">
+        <p14:creationId xmlns:p14="http://schemas.microsoft.com/office/powerpoint/2010/main" val="1420441419"/>
+      </p:ext>
+    </p:extLst>
+  </p:cSld>
+  <p:clrMap bg1="lt1" tx1="dk1" bg2="lt2" tx2="dk2" accent1="accent1" accent2="accent2" accent3="accent3" accent4="accent4" accent5="accent5" accent6="accent6" hlink="hlink" folHlink="folHlink"/>
+  <p:notesStyle>
+    <a:lvl1pPr marL="0" algn="l" defTabSz="914400" rtl="0" eaLnBrk="1" latinLnBrk="0" hangingPunct="1">
+      <a:defRPr sz="1200" kern="1200">
+        <a:solidFill>
+          <a:schemeClr val="tx1"/>
+        </a:solidFill>
+        <a:latin typeface="+mn-lt"/>
+        <a:ea typeface="+mn-ea"/>
+        <a:cs typeface="+mn-cs"/>
+      </a:defRPr>
+    </a:lvl1pPr>
+    <a:lvl2pPr marL="457200" algn="l" defTabSz="914400" rtl="0" eaLnBrk="1" latinLnBrk="0" hangingPunct="1">
+      <a:defRPr sz="1200" kern="1200">
+        <a:solidFill>
+          <a:schemeClr val="tx1"/>
+        </a:solidFill>
+        <a:latin typeface="+mn-lt"/>
+        <a:ea typeface="+mn-ea"/>
+        <a:cs typeface="+mn-cs"/>
+      </a:defRPr>
+    </a:lvl2pPr>
+    <a:lvl3pPr marL="914400" algn="l" defTabSz="914400" rtl="0" eaLnBrk="1" latinLnBrk="0" hangingPunct="1">
+      <a:defRPr sz="1200" kern="1200">
+        <a:solidFill>
+          <a:schemeClr val="tx1"/>
+        </a:solidFill>
+        <a:latin typeface="+mn-lt"/>
+        <a:ea typeface="+mn-ea"/>
+        <a:cs typeface="+mn-cs"/>
+      </a:defRPr>
+    </a:lvl3pPr>
+    <a:lvl4pPr marL="1371600" algn="l" defTabSz="914400" rtl="0" eaLnBrk="1" latinLnBrk="0" hangingPunct="1">
+      <a:defRPr sz="1200" kern="1200">
+        <a:solidFill>
+          <a:schemeClr val="tx1"/>
+        </a:solidFill>
+        <a:latin typeface="+mn-lt"/>
+        <a:ea typeface="+mn-ea"/>
+        <a:cs typeface="+mn-cs"/>
+      </a:defRPr>
+    </a:lvl4pPr>
+    <a:lvl5pPr marL="1828800" algn="l" defTabSz="914400" rtl="0" eaLnBrk="1" latinLnBrk="0" hangingPunct="1">
+      <a:defRPr sz="1200" kern="1200">
+        <a:solidFill>
+          <a:schemeClr val="tx1"/>
+        </a:solidFill>
+        <a:latin typeface="+mn-lt"/>
+        <a:ea typeface="+mn-ea"/>
+        <a:cs typeface="+mn-cs"/>
+      </a:defRPr>
+    </a:lvl5pPr>
+    <a:lvl6pPr marL="2286000" algn="l" defTabSz="914400" rtl="0" eaLnBrk="1" latinLnBrk="0" hangingPunct="1">
+      <a:defRPr sz="1200" kern="1200">
+        <a:solidFill>
+          <a:schemeClr val="tx1"/>
+        </a:solidFill>
+        <a:latin typeface="+mn-lt"/>
+        <a:ea typeface="+mn-ea"/>
+        <a:cs typeface="+mn-cs"/>
+      </a:defRPr>
+    </a:lvl6pPr>
+    <a:lvl7pPr marL="2743200" algn="l" defTabSz="914400" rtl="0" eaLnBrk="1" latinLnBrk="0" hangingPunct="1">
+      <a:defRPr sz="1200" kern="1200">
+        <a:solidFill>
+          <a:schemeClr val="tx1"/>
+        </a:solidFill>
+        <a:latin typeface="+mn-lt"/>
+        <a:ea typeface="+mn-ea"/>
+        <a:cs typeface="+mn-cs"/>
+      </a:defRPr>
+    </a:lvl7pPr>
+    <a:lvl8pPr marL="3200400" algn="l" defTabSz="914400" rtl="0" eaLnBrk="1" latinLnBrk="0" hangingPunct="1">
+      <a:defRPr sz="1200" kern="1200">
+        <a:solidFill>
+          <a:schemeClr val="tx1"/>
+        </a:solidFill>
+        <a:latin typeface="+mn-lt"/>
+        <a:ea typeface="+mn-ea"/>
+        <a:cs typeface="+mn-cs"/>
+      </a:defRPr>
+    </a:lvl8pPr>
+    <a:lvl9pPr marL="3657600" algn="l" defTabSz="914400" rtl="0" eaLnBrk="1" latinLnBrk="0" hangingPunct="1">
+      <a:defRPr sz="1200" kern="1200">
+        <a:solidFill>
+          <a:schemeClr val="tx1"/>
+        </a:solidFill>
+        <a:latin typeface="+mn-lt"/>
+        <a:ea typeface="+mn-ea"/>
+        <a:cs typeface="+mn-cs"/>
+      </a:defRPr>
+    </a:lvl9pPr>
+  </p:notesStyle>
+</p:notesMaster>
+</file>
+
+<file path=ppt/notesSlides/notesSlide1.xml><?xml version="1.0" encoding="utf-8"?>
+<p:notes xmlns:a="http://schemas.openxmlformats.org/drawingml/2006/main" xmlns:r="http://schemas.openxmlformats.org/officeDocument/2006/relationships" xmlns:p="http://schemas.openxmlformats.org/presentationml/2006/main">
+  <p:cSld>
+    <p:spTree>
+      <p:nvGrpSpPr>
+        <p:cNvPr id="1" name=""/>
+        <p:cNvGrpSpPr/>
+        <p:nvPr/>
+      </p:nvGrpSpPr>
+      <p:grpSpPr>
+        <a:xfrm>
+          <a:off x="0" y="0"/>
+          <a:ext cx="0" cy="0"/>
+          <a:chOff x="0" y="0"/>
+          <a:chExt cx="0" cy="0"/>
+        </a:xfrm>
+      </p:grpSpPr>
+      <p:sp>
+        <p:nvSpPr>
+          <p:cNvPr id="2" name="幻灯片图像占位符 1"/>
+          <p:cNvSpPr>
+            <a:spLocks noGrp="1" noRot="1" noChangeAspect="1"/>
+          </p:cNvSpPr>
+          <p:nvPr>
+            <p:ph type="sldImg"/>
+          </p:nvPr>
+        </p:nvSpPr>
+        <p:spPr/>
+      </p:sp>
+      <p:sp>
+        <p:nvSpPr>
+          <p:cNvPr id="3" name="备注占位符 2"/>
+          <p:cNvSpPr>
+            <a:spLocks noGrp="1"/>
+          </p:cNvSpPr>
+          <p:nvPr>
+            <p:ph type="body" idx="1"/>
+          </p:nvPr>
+        </p:nvSpPr>
+        <p:spPr/>
+        <p:txBody>
+          <a:bodyPr/>
+          <a:lstStyle/>
+          <a:p>
+            <a:endParaRPr lang="zh-CN" altLang="en-US" dirty="0"/>
+          </a:p>
+        </p:txBody>
+      </p:sp>
+      <p:sp>
+        <p:nvSpPr>
+          <p:cNvPr id="4" name="灯片编号占位符 3"/>
+          <p:cNvSpPr>
+            <a:spLocks noGrp="1"/>
+          </p:cNvSpPr>
+          <p:nvPr>
+            <p:ph type="sldNum" sz="quarter" idx="5"/>
+          </p:nvPr>
+        </p:nvSpPr>
+        <p:spPr/>
+        <p:txBody>
+          <a:bodyPr/>
+          <a:lstStyle/>
+          <a:p>
+            <a:fld id="{387E59EE-C88D-4491-BDE4-DAC2252FA3CC}" type="slidenum">
+              <a:rPr lang="zh-CN" altLang="en-US" smtClean="0"/>
+              <a:t>9</a:t>
+            </a:fld>
+            <a:endParaRPr lang="zh-CN" altLang="en-US"/>
+          </a:p>
+        </p:txBody>
+      </p:sp>
+    </p:spTree>
+    <p:extLst>
+      <p:ext uri="{BB962C8B-B14F-4D97-AF65-F5344CB8AC3E}">
+        <p14:creationId xmlns:p14="http://schemas.microsoft.com/office/powerpoint/2010/main" val="2954701207"/>
+      </p:ext>
+    </p:extLst>
+  </p:cSld>
+  <p:clrMapOvr>
+    <a:masterClrMapping/>
+  </p:clrMapOvr>
+</p:notes>
 </file>
 
 <file path=ppt/slideLayouts/slideLayout1.xml><?xml version="1.0" encoding="utf-8"?>
@@ -3209,976 +3642,6 @@
 </p:sld>
 </file>
 
-<file path=ppt/slides/slide10.xml><?xml version="1.0" encoding="utf-8"?>
-<p:sld xmlns:a="http://schemas.openxmlformats.org/drawingml/2006/main" xmlns:r="http://schemas.openxmlformats.org/officeDocument/2006/relationships" xmlns:p="http://schemas.openxmlformats.org/presentationml/2006/main">
-  <p:cSld>
-    <p:spTree>
-      <p:nvGrpSpPr>
-        <p:cNvPr id="1" name=""/>
-        <p:cNvGrpSpPr/>
-        <p:nvPr/>
-      </p:nvGrpSpPr>
-      <p:grpSpPr>
-        <a:xfrm>
-          <a:off x="0" y="0"/>
-          <a:ext cx="0" cy="0"/>
-          <a:chOff x="0" y="0"/>
-          <a:chExt cx="0" cy="0"/>
-        </a:xfrm>
-      </p:grpSpPr>
-      <p:sp>
-        <p:nvSpPr>
-          <p:cNvPr id="4" name="TextBox 3"/>
-          <p:cNvSpPr txBox="1"/>
-          <p:nvPr/>
-        </p:nvSpPr>
-        <p:spPr>
-          <a:xfrm>
-            <a:off x="577128" y="757054"/>
-            <a:ext cx="8340629" cy="707886"/>
-          </a:xfrm>
-          <a:prstGeom prst="rect">
-            <a:avLst/>
-          </a:prstGeom>
-          <a:noFill/>
-        </p:spPr>
-        <p:txBody>
-          <a:bodyPr wrap="square" rtlCol="0">
-            <a:spAutoFit/>
-          </a:bodyPr>
-          <a:lstStyle/>
-          <a:p>
-            <a:r>
-              <a:rPr lang="zh-CN" altLang="en-US" sz="4000" dirty="0"/>
-              <a:t>实验设置</a:t>
-            </a:r>
-            <a:endParaRPr lang="en-US" sz="4000" dirty="0"/>
-          </a:p>
-        </p:txBody>
-      </p:sp>
-      <p:sp>
-        <p:nvSpPr>
-          <p:cNvPr id="3" name="内容占位符 2">
-            <a:extLst>
-              <a:ext uri="{FF2B5EF4-FFF2-40B4-BE49-F238E27FC236}">
-                <a16:creationId xmlns:a16="http://schemas.microsoft.com/office/drawing/2014/main" id="{F1ADDDE5-B409-4009-A8DB-6FBC8EF44666}"/>
-              </a:ext>
-            </a:extLst>
-          </p:cNvPr>
-          <p:cNvSpPr>
-            <a:spLocks noGrp="1"/>
-          </p:cNvSpPr>
-          <p:nvPr/>
-        </p:nvSpPr>
-        <p:spPr>
-          <a:xfrm>
-            <a:off x="577128" y="1564416"/>
-            <a:ext cx="10763317" cy="1602990"/>
-          </a:xfrm>
-          <a:prstGeom prst="rect">
-            <a:avLst/>
-          </a:prstGeom>
-        </p:spPr>
-        <p:txBody>
-          <a:bodyPr vert="horz" lIns="91440" tIns="45720" rIns="91440" bIns="45720" rtlCol="0">
-            <a:normAutofit/>
-          </a:bodyPr>
-          <a:lstStyle>
-            <a:lvl1pPr marL="228600" indent="-228600" algn="l" defTabSz="914400" rtl="0" eaLnBrk="1" latinLnBrk="0" hangingPunct="1">
-              <a:lnSpc>
-                <a:spcPct val="90000"/>
-              </a:lnSpc>
-              <a:spcBef>
-                <a:spcPts val="1000"/>
-              </a:spcBef>
-              <a:buFont typeface="Arial" panose="020B0604020202020204" pitchFamily="34" charset="0"/>
-              <a:buChar char="•"/>
-              <a:defRPr sz="2800" kern="1200">
-                <a:solidFill>
-                  <a:schemeClr val="tx1"/>
-                </a:solidFill>
-                <a:latin typeface="+mn-lt"/>
-                <a:ea typeface="+mn-ea"/>
-                <a:cs typeface="+mn-cs"/>
-              </a:defRPr>
-            </a:lvl1pPr>
-            <a:lvl2pPr marL="685800" indent="-228600" algn="l" defTabSz="914400" rtl="0" eaLnBrk="1" latinLnBrk="0" hangingPunct="1">
-              <a:lnSpc>
-                <a:spcPct val="90000"/>
-              </a:lnSpc>
-              <a:spcBef>
-                <a:spcPts val="500"/>
-              </a:spcBef>
-              <a:buFont typeface="Arial" panose="020B0604020202020204" pitchFamily="34" charset="0"/>
-              <a:buChar char="•"/>
-              <a:defRPr sz="2400" kern="1200">
-                <a:solidFill>
-                  <a:schemeClr val="tx1"/>
-                </a:solidFill>
-                <a:latin typeface="+mn-lt"/>
-                <a:ea typeface="+mn-ea"/>
-                <a:cs typeface="+mn-cs"/>
-              </a:defRPr>
-            </a:lvl2pPr>
-            <a:lvl3pPr marL="1143000" indent="-228600" algn="l" defTabSz="914400" rtl="0" eaLnBrk="1" latinLnBrk="0" hangingPunct="1">
-              <a:lnSpc>
-                <a:spcPct val="90000"/>
-              </a:lnSpc>
-              <a:spcBef>
-                <a:spcPts val="500"/>
-              </a:spcBef>
-              <a:buFont typeface="Arial" panose="020B0604020202020204" pitchFamily="34" charset="0"/>
-              <a:buChar char="•"/>
-              <a:defRPr sz="2000" kern="1200">
-                <a:solidFill>
-                  <a:schemeClr val="tx1"/>
-                </a:solidFill>
-                <a:latin typeface="+mn-lt"/>
-                <a:ea typeface="+mn-ea"/>
-                <a:cs typeface="+mn-cs"/>
-              </a:defRPr>
-            </a:lvl3pPr>
-            <a:lvl4pPr marL="1600200" indent="-228600" algn="l" defTabSz="914400" rtl="0" eaLnBrk="1" latinLnBrk="0" hangingPunct="1">
-              <a:lnSpc>
-                <a:spcPct val="90000"/>
-              </a:lnSpc>
-              <a:spcBef>
-                <a:spcPts val="500"/>
-              </a:spcBef>
-              <a:buFont typeface="Arial" panose="020B0604020202020204" pitchFamily="34" charset="0"/>
-              <a:buChar char="•"/>
-              <a:defRPr sz="1800" kern="1200">
-                <a:solidFill>
-                  <a:schemeClr val="tx1"/>
-                </a:solidFill>
-                <a:latin typeface="+mn-lt"/>
-                <a:ea typeface="+mn-ea"/>
-                <a:cs typeface="+mn-cs"/>
-              </a:defRPr>
-            </a:lvl4pPr>
-            <a:lvl5pPr marL="2057400" indent="-228600" algn="l" defTabSz="914400" rtl="0" eaLnBrk="1" latinLnBrk="0" hangingPunct="1">
-              <a:lnSpc>
-                <a:spcPct val="90000"/>
-              </a:lnSpc>
-              <a:spcBef>
-                <a:spcPts val="500"/>
-              </a:spcBef>
-              <a:buFont typeface="Arial" panose="020B0604020202020204" pitchFamily="34" charset="0"/>
-              <a:buChar char="•"/>
-              <a:defRPr sz="1800" kern="1200">
-                <a:solidFill>
-                  <a:schemeClr val="tx1"/>
-                </a:solidFill>
-                <a:latin typeface="+mn-lt"/>
-                <a:ea typeface="+mn-ea"/>
-                <a:cs typeface="+mn-cs"/>
-              </a:defRPr>
-            </a:lvl5pPr>
-            <a:lvl6pPr marL="2514600" indent="-228600" algn="l" defTabSz="914400" rtl="0" eaLnBrk="1" latinLnBrk="0" hangingPunct="1">
-              <a:lnSpc>
-                <a:spcPct val="90000"/>
-              </a:lnSpc>
-              <a:spcBef>
-                <a:spcPts val="500"/>
-              </a:spcBef>
-              <a:buFont typeface="Arial" panose="020B0604020202020204" pitchFamily="34" charset="0"/>
-              <a:buChar char="•"/>
-              <a:defRPr sz="1800" kern="1200">
-                <a:solidFill>
-                  <a:schemeClr val="tx1"/>
-                </a:solidFill>
-                <a:latin typeface="+mn-lt"/>
-                <a:ea typeface="+mn-ea"/>
-                <a:cs typeface="+mn-cs"/>
-              </a:defRPr>
-            </a:lvl6pPr>
-            <a:lvl7pPr marL="2971800" indent="-228600" algn="l" defTabSz="914400" rtl="0" eaLnBrk="1" latinLnBrk="0" hangingPunct="1">
-              <a:lnSpc>
-                <a:spcPct val="90000"/>
-              </a:lnSpc>
-              <a:spcBef>
-                <a:spcPts val="500"/>
-              </a:spcBef>
-              <a:buFont typeface="Arial" panose="020B0604020202020204" pitchFamily="34" charset="0"/>
-              <a:buChar char="•"/>
-              <a:defRPr sz="1800" kern="1200">
-                <a:solidFill>
-                  <a:schemeClr val="tx1"/>
-                </a:solidFill>
-                <a:latin typeface="+mn-lt"/>
-                <a:ea typeface="+mn-ea"/>
-                <a:cs typeface="+mn-cs"/>
-              </a:defRPr>
-            </a:lvl7pPr>
-            <a:lvl8pPr marL="3429000" indent="-228600" algn="l" defTabSz="914400" rtl="0" eaLnBrk="1" latinLnBrk="0" hangingPunct="1">
-              <a:lnSpc>
-                <a:spcPct val="90000"/>
-              </a:lnSpc>
-              <a:spcBef>
-                <a:spcPts val="500"/>
-              </a:spcBef>
-              <a:buFont typeface="Arial" panose="020B0604020202020204" pitchFamily="34" charset="0"/>
-              <a:buChar char="•"/>
-              <a:defRPr sz="1800" kern="1200">
-                <a:solidFill>
-                  <a:schemeClr val="tx1"/>
-                </a:solidFill>
-                <a:latin typeface="+mn-lt"/>
-                <a:ea typeface="+mn-ea"/>
-                <a:cs typeface="+mn-cs"/>
-              </a:defRPr>
-            </a:lvl8pPr>
-            <a:lvl9pPr marL="3886200" indent="-228600" algn="l" defTabSz="914400" rtl="0" eaLnBrk="1" latinLnBrk="0" hangingPunct="1">
-              <a:lnSpc>
-                <a:spcPct val="90000"/>
-              </a:lnSpc>
-              <a:spcBef>
-                <a:spcPts val="500"/>
-              </a:spcBef>
-              <a:buFont typeface="Arial" panose="020B0604020202020204" pitchFamily="34" charset="0"/>
-              <a:buChar char="•"/>
-              <a:defRPr sz="1800" kern="1200">
-                <a:solidFill>
-                  <a:schemeClr val="tx1"/>
-                </a:solidFill>
-                <a:latin typeface="+mn-lt"/>
-                <a:ea typeface="+mn-ea"/>
-                <a:cs typeface="+mn-cs"/>
-              </a:defRPr>
-            </a:lvl9pPr>
-          </a:lstStyle>
-          <a:p>
-            <a:pPr marL="0" indent="0">
-              <a:buNone/>
-            </a:pPr>
-            <a:r>
-              <a:rPr lang="zh-CN" altLang="en-US" dirty="0"/>
-              <a:t>以下是该实验所使用的 </a:t>
-            </a:r>
-            <a:r>
-              <a:rPr lang="en-US" altLang="zh-CN" dirty="0"/>
-              <a:t>7 </a:t>
-            </a:r>
-            <a:r>
-              <a:rPr lang="zh-CN" altLang="en-US" dirty="0"/>
-              <a:t>个数据集，其中展示了每一个数据集的训练样本数、测试样本数和最终分类数。</a:t>
-            </a:r>
-            <a:r>
-              <a:rPr lang="en-US" altLang="zh-CN" dirty="0"/>
-              <a:t>Elec </a:t>
-            </a:r>
-            <a:r>
-              <a:rPr lang="zh-CN" altLang="en-US" dirty="0"/>
-              <a:t>和 </a:t>
-            </a:r>
-            <a:r>
-              <a:rPr lang="en-US" altLang="zh-CN" dirty="0"/>
-              <a:t>IMDB </a:t>
-            </a:r>
-            <a:r>
-              <a:rPr lang="zh-CN" altLang="en-US" dirty="0"/>
-              <a:t>数据集用于情感分析，其它的都用于图像识别。</a:t>
-            </a:r>
-          </a:p>
-        </p:txBody>
-      </p:sp>
-      <p:pic>
-        <p:nvPicPr>
-          <p:cNvPr id="6" name="图片 5">
-            <a:extLst>
-              <a:ext uri="{FF2B5EF4-FFF2-40B4-BE49-F238E27FC236}">
-                <a16:creationId xmlns:a16="http://schemas.microsoft.com/office/drawing/2014/main" id="{48593E40-D6EC-42CC-B19A-84447B33C491}"/>
-              </a:ext>
-            </a:extLst>
-          </p:cNvPr>
-          <p:cNvPicPr>
-            <a:picLocks noChangeAspect="1"/>
-          </p:cNvPicPr>
-          <p:nvPr/>
-        </p:nvPicPr>
-        <p:blipFill>
-          <a:blip r:embed="rId2"/>
-          <a:stretch>
-            <a:fillRect/>
-          </a:stretch>
-        </p:blipFill>
-        <p:spPr>
-          <a:xfrm>
-            <a:off x="1790268" y="3266883"/>
-            <a:ext cx="7826118" cy="3169170"/>
-          </a:xfrm>
-          <a:prstGeom prst="rect">
-            <a:avLst/>
-          </a:prstGeom>
-        </p:spPr>
-      </p:pic>
-    </p:spTree>
-    <p:extLst>
-      <p:ext uri="{BB962C8B-B14F-4D97-AF65-F5344CB8AC3E}">
-        <p14:creationId xmlns:p14="http://schemas.microsoft.com/office/powerpoint/2010/main" val="2604387901"/>
-      </p:ext>
-    </p:extLst>
-  </p:cSld>
-  <p:clrMapOvr>
-    <a:masterClrMapping/>
-  </p:clrMapOvr>
-</p:sld>
-</file>
-
-<file path=ppt/slides/slide11.xml><?xml version="1.0" encoding="utf-8"?>
-<p:sld xmlns:a="http://schemas.openxmlformats.org/drawingml/2006/main" xmlns:r="http://schemas.openxmlformats.org/officeDocument/2006/relationships" xmlns:p="http://schemas.openxmlformats.org/presentationml/2006/main">
-  <p:cSld>
-    <p:spTree>
-      <p:nvGrpSpPr>
-        <p:cNvPr id="1" name=""/>
-        <p:cNvGrpSpPr/>
-        <p:nvPr/>
-      </p:nvGrpSpPr>
-      <p:grpSpPr>
-        <a:xfrm>
-          <a:off x="0" y="0"/>
-          <a:ext cx="0" cy="0"/>
-          <a:chOff x="0" y="0"/>
-          <a:chExt cx="0" cy="0"/>
-        </a:xfrm>
-      </p:grpSpPr>
-      <p:sp>
-        <p:nvSpPr>
-          <p:cNvPr id="4" name="TextBox 3"/>
-          <p:cNvSpPr txBox="1"/>
-          <p:nvPr/>
-        </p:nvSpPr>
-        <p:spPr>
-          <a:xfrm>
-            <a:off x="577128" y="757054"/>
-            <a:ext cx="8340629" cy="707886"/>
-          </a:xfrm>
-          <a:prstGeom prst="rect">
-            <a:avLst/>
-          </a:prstGeom>
-          <a:noFill/>
-        </p:spPr>
-        <p:txBody>
-          <a:bodyPr wrap="square" rtlCol="0">
-            <a:spAutoFit/>
-          </a:bodyPr>
-          <a:lstStyle/>
-          <a:p>
-            <a:r>
-              <a:rPr lang="zh-CN" altLang="en-US" sz="4000" dirty="0"/>
-              <a:t>试验结果与结论</a:t>
-            </a:r>
-            <a:endParaRPr lang="en-US" sz="4000" dirty="0"/>
-          </a:p>
-        </p:txBody>
-      </p:sp>
-      <p:sp>
-        <p:nvSpPr>
-          <p:cNvPr id="3" name="内容占位符 2">
-            <a:extLst>
-              <a:ext uri="{FF2B5EF4-FFF2-40B4-BE49-F238E27FC236}">
-                <a16:creationId xmlns:a16="http://schemas.microsoft.com/office/drawing/2014/main" id="{F1ADDDE5-B409-4009-A8DB-6FBC8EF44666}"/>
-              </a:ext>
-            </a:extLst>
-          </p:cNvPr>
-          <p:cNvSpPr>
-            <a:spLocks noGrp="1"/>
-          </p:cNvSpPr>
-          <p:nvPr/>
-        </p:nvSpPr>
-        <p:spPr>
-          <a:xfrm>
-            <a:off x="577128" y="1564416"/>
-            <a:ext cx="10763317" cy="1602990"/>
-          </a:xfrm>
-          <a:prstGeom prst="rect">
-            <a:avLst/>
-          </a:prstGeom>
-        </p:spPr>
-        <p:txBody>
-          <a:bodyPr vert="horz" lIns="91440" tIns="45720" rIns="91440" bIns="45720" rtlCol="0">
-            <a:normAutofit/>
-          </a:bodyPr>
-          <a:lstStyle>
-            <a:lvl1pPr marL="228600" indent="-228600" algn="l" defTabSz="914400" rtl="0" eaLnBrk="1" latinLnBrk="0" hangingPunct="1">
-              <a:lnSpc>
-                <a:spcPct val="90000"/>
-              </a:lnSpc>
-              <a:spcBef>
-                <a:spcPts val="1000"/>
-              </a:spcBef>
-              <a:buFont typeface="Arial" panose="020B0604020202020204" pitchFamily="34" charset="0"/>
-              <a:buChar char="•"/>
-              <a:defRPr sz="2800" kern="1200">
-                <a:solidFill>
-                  <a:schemeClr val="tx1"/>
-                </a:solidFill>
-                <a:latin typeface="+mn-lt"/>
-                <a:ea typeface="+mn-ea"/>
-                <a:cs typeface="+mn-cs"/>
-              </a:defRPr>
-            </a:lvl1pPr>
-            <a:lvl2pPr marL="685800" indent="-228600" algn="l" defTabSz="914400" rtl="0" eaLnBrk="1" latinLnBrk="0" hangingPunct="1">
-              <a:lnSpc>
-                <a:spcPct val="90000"/>
-              </a:lnSpc>
-              <a:spcBef>
-                <a:spcPts val="500"/>
-              </a:spcBef>
-              <a:buFont typeface="Arial" panose="020B0604020202020204" pitchFamily="34" charset="0"/>
-              <a:buChar char="•"/>
-              <a:defRPr sz="2400" kern="1200">
-                <a:solidFill>
-                  <a:schemeClr val="tx1"/>
-                </a:solidFill>
-                <a:latin typeface="+mn-lt"/>
-                <a:ea typeface="+mn-ea"/>
-                <a:cs typeface="+mn-cs"/>
-              </a:defRPr>
-            </a:lvl2pPr>
-            <a:lvl3pPr marL="1143000" indent="-228600" algn="l" defTabSz="914400" rtl="0" eaLnBrk="1" latinLnBrk="0" hangingPunct="1">
-              <a:lnSpc>
-                <a:spcPct val="90000"/>
-              </a:lnSpc>
-              <a:spcBef>
-                <a:spcPts val="500"/>
-              </a:spcBef>
-              <a:buFont typeface="Arial" panose="020B0604020202020204" pitchFamily="34" charset="0"/>
-              <a:buChar char="•"/>
-              <a:defRPr sz="2000" kern="1200">
-                <a:solidFill>
-                  <a:schemeClr val="tx1"/>
-                </a:solidFill>
-                <a:latin typeface="+mn-lt"/>
-                <a:ea typeface="+mn-ea"/>
-                <a:cs typeface="+mn-cs"/>
-              </a:defRPr>
-            </a:lvl3pPr>
-            <a:lvl4pPr marL="1600200" indent="-228600" algn="l" defTabSz="914400" rtl="0" eaLnBrk="1" latinLnBrk="0" hangingPunct="1">
-              <a:lnSpc>
-                <a:spcPct val="90000"/>
-              </a:lnSpc>
-              <a:spcBef>
-                <a:spcPts val="500"/>
-              </a:spcBef>
-              <a:buFont typeface="Arial" panose="020B0604020202020204" pitchFamily="34" charset="0"/>
-              <a:buChar char="•"/>
-              <a:defRPr sz="1800" kern="1200">
-                <a:solidFill>
-                  <a:schemeClr val="tx1"/>
-                </a:solidFill>
-                <a:latin typeface="+mn-lt"/>
-                <a:ea typeface="+mn-ea"/>
-                <a:cs typeface="+mn-cs"/>
-              </a:defRPr>
-            </a:lvl4pPr>
-            <a:lvl5pPr marL="2057400" indent="-228600" algn="l" defTabSz="914400" rtl="0" eaLnBrk="1" latinLnBrk="0" hangingPunct="1">
-              <a:lnSpc>
-                <a:spcPct val="90000"/>
-              </a:lnSpc>
-              <a:spcBef>
-                <a:spcPts val="500"/>
-              </a:spcBef>
-              <a:buFont typeface="Arial" panose="020B0604020202020204" pitchFamily="34" charset="0"/>
-              <a:buChar char="•"/>
-              <a:defRPr sz="1800" kern="1200">
-                <a:solidFill>
-                  <a:schemeClr val="tx1"/>
-                </a:solidFill>
-                <a:latin typeface="+mn-lt"/>
-                <a:ea typeface="+mn-ea"/>
-                <a:cs typeface="+mn-cs"/>
-              </a:defRPr>
-            </a:lvl5pPr>
-            <a:lvl6pPr marL="2514600" indent="-228600" algn="l" defTabSz="914400" rtl="0" eaLnBrk="1" latinLnBrk="0" hangingPunct="1">
-              <a:lnSpc>
-                <a:spcPct val="90000"/>
-              </a:lnSpc>
-              <a:spcBef>
-                <a:spcPts val="500"/>
-              </a:spcBef>
-              <a:buFont typeface="Arial" panose="020B0604020202020204" pitchFamily="34" charset="0"/>
-              <a:buChar char="•"/>
-              <a:defRPr sz="1800" kern="1200">
-                <a:solidFill>
-                  <a:schemeClr val="tx1"/>
-                </a:solidFill>
-                <a:latin typeface="+mn-lt"/>
-                <a:ea typeface="+mn-ea"/>
-                <a:cs typeface="+mn-cs"/>
-              </a:defRPr>
-            </a:lvl6pPr>
-            <a:lvl7pPr marL="2971800" indent="-228600" algn="l" defTabSz="914400" rtl="0" eaLnBrk="1" latinLnBrk="0" hangingPunct="1">
-              <a:lnSpc>
-                <a:spcPct val="90000"/>
-              </a:lnSpc>
-              <a:spcBef>
-                <a:spcPts val="500"/>
-              </a:spcBef>
-              <a:buFont typeface="Arial" panose="020B0604020202020204" pitchFamily="34" charset="0"/>
-              <a:buChar char="•"/>
-              <a:defRPr sz="1800" kern="1200">
-                <a:solidFill>
-                  <a:schemeClr val="tx1"/>
-                </a:solidFill>
-                <a:latin typeface="+mn-lt"/>
-                <a:ea typeface="+mn-ea"/>
-                <a:cs typeface="+mn-cs"/>
-              </a:defRPr>
-            </a:lvl7pPr>
-            <a:lvl8pPr marL="3429000" indent="-228600" algn="l" defTabSz="914400" rtl="0" eaLnBrk="1" latinLnBrk="0" hangingPunct="1">
-              <a:lnSpc>
-                <a:spcPct val="90000"/>
-              </a:lnSpc>
-              <a:spcBef>
-                <a:spcPts val="500"/>
-              </a:spcBef>
-              <a:buFont typeface="Arial" panose="020B0604020202020204" pitchFamily="34" charset="0"/>
-              <a:buChar char="•"/>
-              <a:defRPr sz="1800" kern="1200">
-                <a:solidFill>
-                  <a:schemeClr val="tx1"/>
-                </a:solidFill>
-                <a:latin typeface="+mn-lt"/>
-                <a:ea typeface="+mn-ea"/>
-                <a:cs typeface="+mn-cs"/>
-              </a:defRPr>
-            </a:lvl8pPr>
-            <a:lvl9pPr marL="3886200" indent="-228600" algn="l" defTabSz="914400" rtl="0" eaLnBrk="1" latinLnBrk="0" hangingPunct="1">
-              <a:lnSpc>
-                <a:spcPct val="90000"/>
-              </a:lnSpc>
-              <a:spcBef>
-                <a:spcPts val="500"/>
-              </a:spcBef>
-              <a:buFont typeface="Arial" panose="020B0604020202020204" pitchFamily="34" charset="0"/>
-              <a:buChar char="•"/>
-              <a:defRPr sz="1800" kern="1200">
-                <a:solidFill>
-                  <a:schemeClr val="tx1"/>
-                </a:solidFill>
-                <a:latin typeface="+mn-lt"/>
-                <a:ea typeface="+mn-ea"/>
-                <a:cs typeface="+mn-cs"/>
-              </a:defRPr>
-            </a:lvl9pPr>
-          </a:lstStyle>
-          <a:p>
-            <a:pPr marL="0" indent="0">
-              <a:buNone/>
-            </a:pPr>
-            <a:r>
-              <a:rPr lang="zh-CN" altLang="en-US" dirty="0"/>
-              <a:t>下表 </a:t>
-            </a:r>
-            <a:r>
-              <a:rPr lang="en-US" altLang="zh-CN" dirty="0"/>
-              <a:t>3 </a:t>
-            </a:r>
-            <a:r>
-              <a:rPr lang="zh-CN" altLang="en-US" dirty="0"/>
-              <a:t>展示了模型在 </a:t>
-            </a:r>
-            <a:r>
-              <a:rPr lang="en-US" altLang="zh-CN" dirty="0"/>
-              <a:t>7 </a:t>
-            </a:r>
-            <a:r>
-              <a:rPr lang="zh-CN" altLang="en-US" dirty="0"/>
-              <a:t>个数据集上的测试准确度、学习率、可训练参数和现有的最佳实验结果。我们实验有三个准确度超过了当前最佳水平，他们都是使用 </a:t>
-            </a:r>
-            <a:r>
-              <a:rPr lang="en-US" altLang="zh-CN" dirty="0"/>
-              <a:t>Adam </a:t>
-            </a:r>
-            <a:r>
-              <a:rPr lang="zh-CN" altLang="en-US" dirty="0"/>
-              <a:t>算法获得的。</a:t>
-            </a:r>
-          </a:p>
-        </p:txBody>
-      </p:sp>
-      <p:pic>
-        <p:nvPicPr>
-          <p:cNvPr id="7" name="图片 6">
-            <a:extLst>
-              <a:ext uri="{FF2B5EF4-FFF2-40B4-BE49-F238E27FC236}">
-                <a16:creationId xmlns:a16="http://schemas.microsoft.com/office/drawing/2014/main" id="{245C4CCA-4016-4125-A160-E2059DBC1FA2}"/>
-              </a:ext>
-            </a:extLst>
-          </p:cNvPr>
-          <p:cNvPicPr>
-            <a:picLocks noChangeAspect="1"/>
-          </p:cNvPicPr>
-          <p:nvPr/>
-        </p:nvPicPr>
-        <p:blipFill>
-          <a:blip r:embed="rId2"/>
-          <a:stretch>
-            <a:fillRect/>
-          </a:stretch>
-        </p:blipFill>
-        <p:spPr>
-          <a:xfrm>
-            <a:off x="2024062" y="3167406"/>
-            <a:ext cx="8143875" cy="3371850"/>
-          </a:xfrm>
-          <a:prstGeom prst="rect">
-            <a:avLst/>
-          </a:prstGeom>
-        </p:spPr>
-      </p:pic>
-    </p:spTree>
-    <p:extLst>
-      <p:ext uri="{BB962C8B-B14F-4D97-AF65-F5344CB8AC3E}">
-        <p14:creationId xmlns:p14="http://schemas.microsoft.com/office/powerpoint/2010/main" val="1911836960"/>
-      </p:ext>
-    </p:extLst>
-  </p:cSld>
-  <p:clrMapOvr>
-    <a:masterClrMapping/>
-  </p:clrMapOvr>
-</p:sld>
-</file>
-
-<file path=ppt/slides/slide12.xml><?xml version="1.0" encoding="utf-8"?>
-<p:sld xmlns:a="http://schemas.openxmlformats.org/drawingml/2006/main" xmlns:r="http://schemas.openxmlformats.org/officeDocument/2006/relationships" xmlns:p="http://schemas.openxmlformats.org/presentationml/2006/main">
-  <p:cSld>
-    <p:spTree>
-      <p:nvGrpSpPr>
-        <p:cNvPr id="1" name=""/>
-        <p:cNvGrpSpPr/>
-        <p:nvPr/>
-      </p:nvGrpSpPr>
-      <p:grpSpPr>
-        <a:xfrm>
-          <a:off x="0" y="0"/>
-          <a:ext cx="0" cy="0"/>
-          <a:chOff x="0" y="0"/>
-          <a:chExt cx="0" cy="0"/>
-        </a:xfrm>
-      </p:grpSpPr>
-      <p:sp>
-        <p:nvSpPr>
-          <p:cNvPr id="4" name="TextBox 3"/>
-          <p:cNvSpPr txBox="1"/>
-          <p:nvPr/>
-        </p:nvSpPr>
-        <p:spPr>
-          <a:xfrm>
-            <a:off x="577128" y="757054"/>
-            <a:ext cx="8340629" cy="707886"/>
-          </a:xfrm>
-          <a:prstGeom prst="rect">
-            <a:avLst/>
-          </a:prstGeom>
-          <a:noFill/>
-        </p:spPr>
-        <p:txBody>
-          <a:bodyPr wrap="square" rtlCol="0">
-            <a:spAutoFit/>
-          </a:bodyPr>
-          <a:lstStyle/>
-          <a:p>
-            <a:r>
-              <a:rPr lang="zh-CN" altLang="en-US" sz="4000" dirty="0"/>
-              <a:t>试验结果与结论</a:t>
-            </a:r>
-            <a:endParaRPr lang="en-US" sz="4000" dirty="0"/>
-          </a:p>
-        </p:txBody>
-      </p:sp>
-      <p:sp>
-        <p:nvSpPr>
-          <p:cNvPr id="3" name="内容占位符 2">
-            <a:extLst>
-              <a:ext uri="{FF2B5EF4-FFF2-40B4-BE49-F238E27FC236}">
-                <a16:creationId xmlns:a16="http://schemas.microsoft.com/office/drawing/2014/main" id="{F1ADDDE5-B409-4009-A8DB-6FBC8EF44666}"/>
-              </a:ext>
-            </a:extLst>
-          </p:cNvPr>
-          <p:cNvSpPr>
-            <a:spLocks noGrp="1"/>
-          </p:cNvSpPr>
-          <p:nvPr/>
-        </p:nvSpPr>
-        <p:spPr>
-          <a:xfrm>
-            <a:off x="577128" y="1564416"/>
-            <a:ext cx="10763317" cy="1602990"/>
-          </a:xfrm>
-          <a:prstGeom prst="rect">
-            <a:avLst/>
-          </a:prstGeom>
-        </p:spPr>
-        <p:txBody>
-          <a:bodyPr vert="horz" lIns="91440" tIns="45720" rIns="91440" bIns="45720" rtlCol="0">
-            <a:normAutofit/>
-          </a:bodyPr>
-          <a:lstStyle>
-            <a:lvl1pPr marL="228600" indent="-228600" algn="l" defTabSz="914400" rtl="0" eaLnBrk="1" latinLnBrk="0" hangingPunct="1">
-              <a:lnSpc>
-                <a:spcPct val="90000"/>
-              </a:lnSpc>
-              <a:spcBef>
-                <a:spcPts val="1000"/>
-              </a:spcBef>
-              <a:buFont typeface="Arial" panose="020B0604020202020204" pitchFamily="34" charset="0"/>
-              <a:buChar char="•"/>
-              <a:defRPr sz="2800" kern="1200">
-                <a:solidFill>
-                  <a:schemeClr val="tx1"/>
-                </a:solidFill>
-                <a:latin typeface="+mn-lt"/>
-                <a:ea typeface="+mn-ea"/>
-                <a:cs typeface="+mn-cs"/>
-              </a:defRPr>
-            </a:lvl1pPr>
-            <a:lvl2pPr marL="685800" indent="-228600" algn="l" defTabSz="914400" rtl="0" eaLnBrk="1" latinLnBrk="0" hangingPunct="1">
-              <a:lnSpc>
-                <a:spcPct val="90000"/>
-              </a:lnSpc>
-              <a:spcBef>
-                <a:spcPts val="500"/>
-              </a:spcBef>
-              <a:buFont typeface="Arial" panose="020B0604020202020204" pitchFamily="34" charset="0"/>
-              <a:buChar char="•"/>
-              <a:defRPr sz="2400" kern="1200">
-                <a:solidFill>
-                  <a:schemeClr val="tx1"/>
-                </a:solidFill>
-                <a:latin typeface="+mn-lt"/>
-                <a:ea typeface="+mn-ea"/>
-                <a:cs typeface="+mn-cs"/>
-              </a:defRPr>
-            </a:lvl2pPr>
-            <a:lvl3pPr marL="1143000" indent="-228600" algn="l" defTabSz="914400" rtl="0" eaLnBrk="1" latinLnBrk="0" hangingPunct="1">
-              <a:lnSpc>
-                <a:spcPct val="90000"/>
-              </a:lnSpc>
-              <a:spcBef>
-                <a:spcPts val="500"/>
-              </a:spcBef>
-              <a:buFont typeface="Arial" panose="020B0604020202020204" pitchFamily="34" charset="0"/>
-              <a:buChar char="•"/>
-              <a:defRPr sz="2000" kern="1200">
-                <a:solidFill>
-                  <a:schemeClr val="tx1"/>
-                </a:solidFill>
-                <a:latin typeface="+mn-lt"/>
-                <a:ea typeface="+mn-ea"/>
-                <a:cs typeface="+mn-cs"/>
-              </a:defRPr>
-            </a:lvl3pPr>
-            <a:lvl4pPr marL="1600200" indent="-228600" algn="l" defTabSz="914400" rtl="0" eaLnBrk="1" latinLnBrk="0" hangingPunct="1">
-              <a:lnSpc>
-                <a:spcPct val="90000"/>
-              </a:lnSpc>
-              <a:spcBef>
-                <a:spcPts val="500"/>
-              </a:spcBef>
-              <a:buFont typeface="Arial" panose="020B0604020202020204" pitchFamily="34" charset="0"/>
-              <a:buChar char="•"/>
-              <a:defRPr sz="1800" kern="1200">
-                <a:solidFill>
-                  <a:schemeClr val="tx1"/>
-                </a:solidFill>
-                <a:latin typeface="+mn-lt"/>
-                <a:ea typeface="+mn-ea"/>
-                <a:cs typeface="+mn-cs"/>
-              </a:defRPr>
-            </a:lvl4pPr>
-            <a:lvl5pPr marL="2057400" indent="-228600" algn="l" defTabSz="914400" rtl="0" eaLnBrk="1" latinLnBrk="0" hangingPunct="1">
-              <a:lnSpc>
-                <a:spcPct val="90000"/>
-              </a:lnSpc>
-              <a:spcBef>
-                <a:spcPts val="500"/>
-              </a:spcBef>
-              <a:buFont typeface="Arial" panose="020B0604020202020204" pitchFamily="34" charset="0"/>
-              <a:buChar char="•"/>
-              <a:defRPr sz="1800" kern="1200">
-                <a:solidFill>
-                  <a:schemeClr val="tx1"/>
-                </a:solidFill>
-                <a:latin typeface="+mn-lt"/>
-                <a:ea typeface="+mn-ea"/>
-                <a:cs typeface="+mn-cs"/>
-              </a:defRPr>
-            </a:lvl5pPr>
-            <a:lvl6pPr marL="2514600" indent="-228600" algn="l" defTabSz="914400" rtl="0" eaLnBrk="1" latinLnBrk="0" hangingPunct="1">
-              <a:lnSpc>
-                <a:spcPct val="90000"/>
-              </a:lnSpc>
-              <a:spcBef>
-                <a:spcPts val="500"/>
-              </a:spcBef>
-              <a:buFont typeface="Arial" panose="020B0604020202020204" pitchFamily="34" charset="0"/>
-              <a:buChar char="•"/>
-              <a:defRPr sz="1800" kern="1200">
-                <a:solidFill>
-                  <a:schemeClr val="tx1"/>
-                </a:solidFill>
-                <a:latin typeface="+mn-lt"/>
-                <a:ea typeface="+mn-ea"/>
-                <a:cs typeface="+mn-cs"/>
-              </a:defRPr>
-            </a:lvl6pPr>
-            <a:lvl7pPr marL="2971800" indent="-228600" algn="l" defTabSz="914400" rtl="0" eaLnBrk="1" latinLnBrk="0" hangingPunct="1">
-              <a:lnSpc>
-                <a:spcPct val="90000"/>
-              </a:lnSpc>
-              <a:spcBef>
-                <a:spcPts val="500"/>
-              </a:spcBef>
-              <a:buFont typeface="Arial" panose="020B0604020202020204" pitchFamily="34" charset="0"/>
-              <a:buChar char="•"/>
-              <a:defRPr sz="1800" kern="1200">
-                <a:solidFill>
-                  <a:schemeClr val="tx1"/>
-                </a:solidFill>
-                <a:latin typeface="+mn-lt"/>
-                <a:ea typeface="+mn-ea"/>
-                <a:cs typeface="+mn-cs"/>
-              </a:defRPr>
-            </a:lvl7pPr>
-            <a:lvl8pPr marL="3429000" indent="-228600" algn="l" defTabSz="914400" rtl="0" eaLnBrk="1" latinLnBrk="0" hangingPunct="1">
-              <a:lnSpc>
-                <a:spcPct val="90000"/>
-              </a:lnSpc>
-              <a:spcBef>
-                <a:spcPts val="500"/>
-              </a:spcBef>
-              <a:buFont typeface="Arial" panose="020B0604020202020204" pitchFamily="34" charset="0"/>
-              <a:buChar char="•"/>
-              <a:defRPr sz="1800" kern="1200">
-                <a:solidFill>
-                  <a:schemeClr val="tx1"/>
-                </a:solidFill>
-                <a:latin typeface="+mn-lt"/>
-                <a:ea typeface="+mn-ea"/>
-                <a:cs typeface="+mn-cs"/>
-              </a:defRPr>
-            </a:lvl8pPr>
-            <a:lvl9pPr marL="3886200" indent="-228600" algn="l" defTabSz="914400" rtl="0" eaLnBrk="1" latinLnBrk="0" hangingPunct="1">
-              <a:lnSpc>
-                <a:spcPct val="90000"/>
-              </a:lnSpc>
-              <a:spcBef>
-                <a:spcPts val="500"/>
-              </a:spcBef>
-              <a:buFont typeface="Arial" panose="020B0604020202020204" pitchFamily="34" charset="0"/>
-              <a:buChar char="•"/>
-              <a:defRPr sz="1800" kern="1200">
-                <a:solidFill>
-                  <a:schemeClr val="tx1"/>
-                </a:solidFill>
-                <a:latin typeface="+mn-lt"/>
-                <a:ea typeface="+mn-ea"/>
-                <a:cs typeface="+mn-cs"/>
-              </a:defRPr>
-            </a:lvl9pPr>
-          </a:lstStyle>
-          <a:p>
-            <a:pPr marL="0" indent="0">
-              <a:buNone/>
-            </a:pPr>
-            <a:r>
-              <a:rPr lang="zh-CN" altLang="en-US" dirty="0"/>
-              <a:t>下图 </a:t>
-            </a:r>
-            <a:r>
-              <a:rPr lang="en-US" altLang="zh-CN" dirty="0"/>
-              <a:t>2 </a:t>
-            </a:r>
-            <a:r>
-              <a:rPr lang="zh-CN" altLang="en-US" dirty="0"/>
-              <a:t>和 </a:t>
-            </a:r>
-            <a:r>
-              <a:rPr lang="en-US" altLang="zh-CN" dirty="0"/>
-              <a:t>3 </a:t>
-            </a:r>
-            <a:r>
-              <a:rPr lang="zh-CN" altLang="en-US" dirty="0"/>
-              <a:t>展示了模型在进化过程中的适应度和学习率变化情况。</a:t>
-            </a:r>
-          </a:p>
-        </p:txBody>
-      </p:sp>
-      <p:pic>
-        <p:nvPicPr>
-          <p:cNvPr id="2" name="图片 1">
-            <a:extLst>
-              <a:ext uri="{FF2B5EF4-FFF2-40B4-BE49-F238E27FC236}">
-                <a16:creationId xmlns:a16="http://schemas.microsoft.com/office/drawing/2014/main" id="{A55BB5C8-CABD-46B1-82ED-8C2E513D3BA1}"/>
-              </a:ext>
-            </a:extLst>
-          </p:cNvPr>
-          <p:cNvPicPr>
-            <a:picLocks noChangeAspect="1"/>
-          </p:cNvPicPr>
-          <p:nvPr/>
-        </p:nvPicPr>
-        <p:blipFill>
-          <a:blip r:embed="rId2"/>
-          <a:stretch>
-            <a:fillRect/>
-          </a:stretch>
-        </p:blipFill>
-        <p:spPr>
-          <a:xfrm>
-            <a:off x="663509" y="2325847"/>
-            <a:ext cx="4171950" cy="4200525"/>
-          </a:xfrm>
-          <a:prstGeom prst="rect">
-            <a:avLst/>
-          </a:prstGeom>
-        </p:spPr>
-      </p:pic>
-      <p:pic>
-        <p:nvPicPr>
-          <p:cNvPr id="6" name="图片 5">
-            <a:extLst>
-              <a:ext uri="{FF2B5EF4-FFF2-40B4-BE49-F238E27FC236}">
-                <a16:creationId xmlns:a16="http://schemas.microsoft.com/office/drawing/2014/main" id="{10BDE160-A633-480B-9B27-DE4086A19494}"/>
-              </a:ext>
-            </a:extLst>
-          </p:cNvPr>
-          <p:cNvPicPr>
-            <a:picLocks noChangeAspect="1"/>
-          </p:cNvPicPr>
-          <p:nvPr/>
-        </p:nvPicPr>
-        <p:blipFill>
-          <a:blip r:embed="rId3"/>
-          <a:stretch>
-            <a:fillRect/>
-          </a:stretch>
-        </p:blipFill>
-        <p:spPr>
-          <a:xfrm>
-            <a:off x="6400652" y="2796176"/>
-            <a:ext cx="3990975" cy="2981325"/>
-          </a:xfrm>
-          <a:prstGeom prst="rect">
-            <a:avLst/>
-          </a:prstGeom>
-        </p:spPr>
-      </p:pic>
-    </p:spTree>
-    <p:extLst>
-      <p:ext uri="{BB962C8B-B14F-4D97-AF65-F5344CB8AC3E}">
-        <p14:creationId xmlns:p14="http://schemas.microsoft.com/office/powerpoint/2010/main" val="2113266709"/>
-      </p:ext>
-    </p:extLst>
-  </p:cSld>
-  <p:clrMapOvr>
-    <a:masterClrMapping/>
-  </p:clrMapOvr>
-</p:sld>
-</file>
-
 <file path=ppt/slides/slide2.xml><?xml version="1.0" encoding="utf-8"?>
 <p:sld xmlns:a="http://schemas.openxmlformats.org/drawingml/2006/main" xmlns:r="http://schemas.openxmlformats.org/officeDocument/2006/relationships" xmlns:p="http://schemas.openxmlformats.org/presentationml/2006/main">
   <p:cSld>
@@ -4220,7 +3683,7 @@
           <a:p>
             <a:r>
               <a:rPr lang="zh-CN" altLang="en-US" sz="4000" dirty="0"/>
-              <a:t>简介</a:t>
+              <a:t>问题的提出</a:t>
             </a:r>
             <a:endParaRPr lang="en-US" sz="4000" dirty="0"/>
           </a:p>
@@ -4449,6 +3912,44 @@
               <a:rPr lang="zh-CN" altLang="en-US" dirty="0"/>
               <a:t>数量。</a:t>
             </a:r>
+            <a:endParaRPr lang="en-US" altLang="zh-CN" dirty="0"/>
+          </a:p>
+          <a:p>
+            <a:pPr marL="0" indent="0">
+              <a:buNone/>
+            </a:pPr>
+            <a:r>
+              <a:rPr lang="zh-CN" altLang="en-US" dirty="0"/>
+              <a:t>为了解决：</a:t>
+            </a:r>
+            <a:endParaRPr lang="en-US" altLang="zh-CN" dirty="0"/>
+          </a:p>
+          <a:p>
+            <a:r>
+              <a:rPr lang="zh-CN" altLang="en-US" dirty="0"/>
+              <a:t>在众多神经网络算法优化问题领域中演化优良的一般性架构和超参数</a:t>
+            </a:r>
+            <a:endParaRPr lang="en-US" altLang="zh-CN" dirty="0"/>
+          </a:p>
+          <a:p>
+            <a:r>
+              <a:rPr lang="zh-CN" altLang="en-US" dirty="0"/>
+              <a:t>这种演化是否可以在单块 </a:t>
+            </a:r>
+            <a:r>
+              <a:rPr lang="en-US" altLang="zh-CN" dirty="0"/>
+              <a:t>GPU </a:t>
+            </a:r>
+            <a:r>
+              <a:rPr lang="zh-CN" altLang="en-US" dirty="0"/>
+              <a:t>上完成，不是像以前一样需要在大型计算集群上完成</a:t>
+            </a:r>
+          </a:p>
+          <a:p>
+            <a:pPr marL="0" indent="0">
+              <a:buNone/>
+            </a:pPr>
+            <a:endParaRPr lang="zh-CN" altLang="en-US" dirty="0"/>
           </a:p>
         </p:txBody>
       </p:sp>
@@ -4506,7 +4007,7 @@
           <a:p>
             <a:r>
               <a:rPr lang="zh-CN" altLang="en-US" sz="4000" dirty="0"/>
-              <a:t>解决的问题</a:t>
+              <a:t>算法优化目标</a:t>
             </a:r>
             <a:endParaRPr lang="en-US" sz="4000" dirty="0"/>
           </a:p>
@@ -4704,280 +4205,9 @@
             </a:lvl9pPr>
           </a:lstStyle>
           <a:p>
-            <a:r>
-              <a:rPr lang="zh-CN" altLang="en-US" dirty="0"/>
-              <a:t>在众多神经网络算法优化问题领域中演化优良的一般性架构和超参数</a:t>
-            </a:r>
-            <a:endParaRPr lang="en-US" altLang="zh-CN" dirty="0"/>
-          </a:p>
-          <a:p>
-            <a:r>
-              <a:rPr lang="zh-CN" altLang="en-US" dirty="0"/>
-              <a:t>这种演化是否可以在单块 </a:t>
-            </a:r>
-            <a:r>
-              <a:rPr lang="en-US" altLang="zh-CN" dirty="0"/>
-              <a:t>GPU </a:t>
-            </a:r>
-            <a:r>
-              <a:rPr lang="zh-CN" altLang="en-US" dirty="0"/>
-              <a:t>上完成，不是像以前一样需要在大型计算集群上完成</a:t>
-            </a:r>
-          </a:p>
-        </p:txBody>
-      </p:sp>
-    </p:spTree>
-    <p:extLst>
-      <p:ext uri="{BB962C8B-B14F-4D97-AF65-F5344CB8AC3E}">
-        <p14:creationId xmlns:p14="http://schemas.microsoft.com/office/powerpoint/2010/main" val="3877858531"/>
-      </p:ext>
-    </p:extLst>
-  </p:cSld>
-  <p:clrMapOvr>
-    <a:masterClrMapping/>
-  </p:clrMapOvr>
-</p:sld>
-</file>
-
-<file path=ppt/slides/slide4.xml><?xml version="1.0" encoding="utf-8"?>
-<p:sld xmlns:a="http://schemas.openxmlformats.org/drawingml/2006/main" xmlns:r="http://schemas.openxmlformats.org/officeDocument/2006/relationships" xmlns:p="http://schemas.openxmlformats.org/presentationml/2006/main">
-  <p:cSld>
-    <p:spTree>
-      <p:nvGrpSpPr>
-        <p:cNvPr id="1" name=""/>
-        <p:cNvGrpSpPr/>
-        <p:nvPr/>
-      </p:nvGrpSpPr>
-      <p:grpSpPr>
-        <a:xfrm>
-          <a:off x="0" y="0"/>
-          <a:ext cx="0" cy="0"/>
-          <a:chOff x="0" y="0"/>
-          <a:chExt cx="0" cy="0"/>
-        </a:xfrm>
-      </p:grpSpPr>
-      <p:sp>
-        <p:nvSpPr>
-          <p:cNvPr id="4" name="TextBox 3"/>
-          <p:cNvSpPr txBox="1"/>
-          <p:nvPr/>
-        </p:nvSpPr>
-        <p:spPr>
-          <a:xfrm>
-            <a:off x="577128" y="757054"/>
-            <a:ext cx="8340629" cy="707886"/>
-          </a:xfrm>
-          <a:prstGeom prst="rect">
-            <a:avLst/>
-          </a:prstGeom>
-          <a:noFill/>
-        </p:spPr>
-        <p:txBody>
-          <a:bodyPr wrap="square" rtlCol="0">
-            <a:spAutoFit/>
-          </a:bodyPr>
-          <a:lstStyle/>
-          <a:p>
-            <a:r>
-              <a:rPr lang="zh-CN" altLang="en-US" sz="4000" dirty="0"/>
-              <a:t>算法目标</a:t>
-            </a:r>
-            <a:endParaRPr lang="en-US" sz="4000" dirty="0"/>
-          </a:p>
-        </p:txBody>
-      </p:sp>
-      <p:sp>
-        <p:nvSpPr>
-          <p:cNvPr id="3" name="内容占位符 2">
-            <a:extLst>
-              <a:ext uri="{FF2B5EF4-FFF2-40B4-BE49-F238E27FC236}">
-                <a16:creationId xmlns:a16="http://schemas.microsoft.com/office/drawing/2014/main" id="{F1ADDDE5-B409-4009-A8DB-6FBC8EF44666}"/>
-              </a:ext>
-            </a:extLst>
-          </p:cNvPr>
-          <p:cNvSpPr>
-            <a:spLocks noGrp="1"/>
-          </p:cNvSpPr>
-          <p:nvPr/>
-        </p:nvSpPr>
-        <p:spPr>
-          <a:xfrm>
-            <a:off x="577128" y="1894354"/>
-            <a:ext cx="11074402" cy="4351338"/>
-          </a:xfrm>
-          <a:prstGeom prst="rect">
-            <a:avLst/>
-          </a:prstGeom>
-        </p:spPr>
-        <p:txBody>
-          <a:bodyPr vert="horz" lIns="91440" tIns="45720" rIns="91440" bIns="45720" rtlCol="0">
-            <a:normAutofit/>
-          </a:bodyPr>
-          <a:lstStyle>
-            <a:lvl1pPr marL="228600" indent="-228600" algn="l" defTabSz="914400" rtl="0" eaLnBrk="1" latinLnBrk="0" hangingPunct="1">
-              <a:lnSpc>
-                <a:spcPct val="90000"/>
-              </a:lnSpc>
-              <a:spcBef>
-                <a:spcPts val="1000"/>
-              </a:spcBef>
-              <a:buFont typeface="Arial" panose="020B0604020202020204" pitchFamily="34" charset="0"/>
-              <a:buChar char="•"/>
-              <a:defRPr sz="2800" kern="1200">
-                <a:solidFill>
-                  <a:schemeClr val="tx1"/>
-                </a:solidFill>
-                <a:latin typeface="+mn-lt"/>
-                <a:ea typeface="+mn-ea"/>
-                <a:cs typeface="+mn-cs"/>
-              </a:defRPr>
-            </a:lvl1pPr>
-            <a:lvl2pPr marL="685800" indent="-228600" algn="l" defTabSz="914400" rtl="0" eaLnBrk="1" latinLnBrk="0" hangingPunct="1">
-              <a:lnSpc>
-                <a:spcPct val="90000"/>
-              </a:lnSpc>
-              <a:spcBef>
-                <a:spcPts val="500"/>
-              </a:spcBef>
-              <a:buFont typeface="Arial" panose="020B0604020202020204" pitchFamily="34" charset="0"/>
-              <a:buChar char="•"/>
-              <a:defRPr sz="2400" kern="1200">
-                <a:solidFill>
-                  <a:schemeClr val="tx1"/>
-                </a:solidFill>
-                <a:latin typeface="+mn-lt"/>
-                <a:ea typeface="+mn-ea"/>
-                <a:cs typeface="+mn-cs"/>
-              </a:defRPr>
-            </a:lvl2pPr>
-            <a:lvl3pPr marL="1143000" indent="-228600" algn="l" defTabSz="914400" rtl="0" eaLnBrk="1" latinLnBrk="0" hangingPunct="1">
-              <a:lnSpc>
-                <a:spcPct val="90000"/>
-              </a:lnSpc>
-              <a:spcBef>
-                <a:spcPts val="500"/>
-              </a:spcBef>
-              <a:buFont typeface="Arial" panose="020B0604020202020204" pitchFamily="34" charset="0"/>
-              <a:buChar char="•"/>
-              <a:defRPr sz="2000" kern="1200">
-                <a:solidFill>
-                  <a:schemeClr val="tx1"/>
-                </a:solidFill>
-                <a:latin typeface="+mn-lt"/>
-                <a:ea typeface="+mn-ea"/>
-                <a:cs typeface="+mn-cs"/>
-              </a:defRPr>
-            </a:lvl3pPr>
-            <a:lvl4pPr marL="1600200" indent="-228600" algn="l" defTabSz="914400" rtl="0" eaLnBrk="1" latinLnBrk="0" hangingPunct="1">
-              <a:lnSpc>
-                <a:spcPct val="90000"/>
-              </a:lnSpc>
-              <a:spcBef>
-                <a:spcPts val="500"/>
-              </a:spcBef>
-              <a:buFont typeface="Arial" panose="020B0604020202020204" pitchFamily="34" charset="0"/>
-              <a:buChar char="•"/>
-              <a:defRPr sz="1800" kern="1200">
-                <a:solidFill>
-                  <a:schemeClr val="tx1"/>
-                </a:solidFill>
-                <a:latin typeface="+mn-lt"/>
-                <a:ea typeface="+mn-ea"/>
-                <a:cs typeface="+mn-cs"/>
-              </a:defRPr>
-            </a:lvl4pPr>
-            <a:lvl5pPr marL="2057400" indent="-228600" algn="l" defTabSz="914400" rtl="0" eaLnBrk="1" latinLnBrk="0" hangingPunct="1">
-              <a:lnSpc>
-                <a:spcPct val="90000"/>
-              </a:lnSpc>
-              <a:spcBef>
-                <a:spcPts val="500"/>
-              </a:spcBef>
-              <a:buFont typeface="Arial" panose="020B0604020202020204" pitchFamily="34" charset="0"/>
-              <a:buChar char="•"/>
-              <a:defRPr sz="1800" kern="1200">
-                <a:solidFill>
-                  <a:schemeClr val="tx1"/>
-                </a:solidFill>
-                <a:latin typeface="+mn-lt"/>
-                <a:ea typeface="+mn-ea"/>
-                <a:cs typeface="+mn-cs"/>
-              </a:defRPr>
-            </a:lvl5pPr>
-            <a:lvl6pPr marL="2514600" indent="-228600" algn="l" defTabSz="914400" rtl="0" eaLnBrk="1" latinLnBrk="0" hangingPunct="1">
-              <a:lnSpc>
-                <a:spcPct val="90000"/>
-              </a:lnSpc>
-              <a:spcBef>
-                <a:spcPts val="500"/>
-              </a:spcBef>
-              <a:buFont typeface="Arial" panose="020B0604020202020204" pitchFamily="34" charset="0"/>
-              <a:buChar char="•"/>
-              <a:defRPr sz="1800" kern="1200">
-                <a:solidFill>
-                  <a:schemeClr val="tx1"/>
-                </a:solidFill>
-                <a:latin typeface="+mn-lt"/>
-                <a:ea typeface="+mn-ea"/>
-                <a:cs typeface="+mn-cs"/>
-              </a:defRPr>
-            </a:lvl6pPr>
-            <a:lvl7pPr marL="2971800" indent="-228600" algn="l" defTabSz="914400" rtl="0" eaLnBrk="1" latinLnBrk="0" hangingPunct="1">
-              <a:lnSpc>
-                <a:spcPct val="90000"/>
-              </a:lnSpc>
-              <a:spcBef>
-                <a:spcPts val="500"/>
-              </a:spcBef>
-              <a:buFont typeface="Arial" panose="020B0604020202020204" pitchFamily="34" charset="0"/>
-              <a:buChar char="•"/>
-              <a:defRPr sz="1800" kern="1200">
-                <a:solidFill>
-                  <a:schemeClr val="tx1"/>
-                </a:solidFill>
-                <a:latin typeface="+mn-lt"/>
-                <a:ea typeface="+mn-ea"/>
-                <a:cs typeface="+mn-cs"/>
-              </a:defRPr>
-            </a:lvl7pPr>
-            <a:lvl8pPr marL="3429000" indent="-228600" algn="l" defTabSz="914400" rtl="0" eaLnBrk="1" latinLnBrk="0" hangingPunct="1">
-              <a:lnSpc>
-                <a:spcPct val="90000"/>
-              </a:lnSpc>
-              <a:spcBef>
-                <a:spcPts val="500"/>
-              </a:spcBef>
-              <a:buFont typeface="Arial" panose="020B0604020202020204" pitchFamily="34" charset="0"/>
-              <a:buChar char="•"/>
-              <a:defRPr sz="1800" kern="1200">
-                <a:solidFill>
-                  <a:schemeClr val="tx1"/>
-                </a:solidFill>
-                <a:latin typeface="+mn-lt"/>
-                <a:ea typeface="+mn-ea"/>
-                <a:cs typeface="+mn-cs"/>
-              </a:defRPr>
-            </a:lvl8pPr>
-            <a:lvl9pPr marL="3886200" indent="-228600" algn="l" defTabSz="914400" rtl="0" eaLnBrk="1" latinLnBrk="0" hangingPunct="1">
-              <a:lnSpc>
-                <a:spcPct val="90000"/>
-              </a:lnSpc>
-              <a:spcBef>
-                <a:spcPts val="500"/>
-              </a:spcBef>
-              <a:buFont typeface="Arial" panose="020B0604020202020204" pitchFamily="34" charset="0"/>
-              <a:buChar char="•"/>
-              <a:defRPr sz="1800" kern="1200">
-                <a:solidFill>
-                  <a:schemeClr val="tx1"/>
-                </a:solidFill>
-                <a:latin typeface="+mn-lt"/>
-                <a:ea typeface="+mn-ea"/>
-                <a:cs typeface="+mn-cs"/>
-              </a:defRPr>
-            </a:lvl9pPr>
-          </a:lstStyle>
-          <a:p>
+            <a:pPr marL="0" indent="0">
+              <a:buNone/>
+            </a:pPr>
             <a:r>
               <a:rPr lang="zh-CN" altLang="en-US" dirty="0"/>
               <a:t>尝试将神经进化应用于创建 </a:t>
@@ -5012,7 +4242,7 @@
 </p:sld>
 </file>
 
-<file path=ppt/slides/slide5.xml><?xml version="1.0" encoding="utf-8"?>
+<file path=ppt/slides/slide4.xml><?xml version="1.0" encoding="utf-8"?>
 <p:sld xmlns:a="http://schemas.openxmlformats.org/drawingml/2006/main" xmlns:r="http://schemas.openxmlformats.org/officeDocument/2006/relationships" xmlns:p="http://schemas.openxmlformats.org/presentationml/2006/main">
   <p:cSld>
     <p:spTree>
@@ -5325,7 +4555,7 @@
 </p:sld>
 </file>
 
-<file path=ppt/slides/slide6.xml><?xml version="1.0" encoding="utf-8"?>
+<file path=ppt/slides/slide5.xml><?xml version="1.0" encoding="utf-8"?>
 <p:sld xmlns:a="http://schemas.openxmlformats.org/drawingml/2006/main" xmlns:r="http://schemas.openxmlformats.org/officeDocument/2006/relationships" xmlns:p="http://schemas.openxmlformats.org/presentationml/2006/main">
   <p:cSld>
     <p:spTree>
@@ -5672,7 +4902,7 @@
 </p:sld>
 </file>
 
-<file path=ppt/slides/slide7.xml><?xml version="1.0" encoding="utf-8"?>
+<file path=ppt/slides/slide6.xml><?xml version="1.0" encoding="utf-8"?>
 <p:sld xmlns:a="http://schemas.openxmlformats.org/drawingml/2006/main" xmlns:r="http://schemas.openxmlformats.org/officeDocument/2006/relationships" xmlns:p="http://schemas.openxmlformats.org/presentationml/2006/main">
   <p:cSld>
     <p:spTree>
@@ -5980,7 +5210,7 @@
 </p:sld>
 </file>
 
-<file path=ppt/slides/slide8.xml><?xml version="1.0" encoding="utf-8"?>
+<file path=ppt/slides/slide7.xml><?xml version="1.0" encoding="utf-8"?>
 <p:sld xmlns:a="http://schemas.openxmlformats.org/drawingml/2006/main" xmlns:r="http://schemas.openxmlformats.org/officeDocument/2006/relationships" xmlns:p="http://schemas.openxmlformats.org/presentationml/2006/main">
   <p:cSld>
     <p:spTree>
@@ -6327,7 +5557,7 @@
 </p:sld>
 </file>
 
-<file path=ppt/slides/slide9.xml><?xml version="1.0" encoding="utf-8"?>
+<file path=ppt/slides/slide8.xml><?xml version="1.0" encoding="utf-8"?>
 <p:sld xmlns:a="http://schemas.openxmlformats.org/drawingml/2006/main" xmlns:r="http://schemas.openxmlformats.org/officeDocument/2006/relationships" xmlns:p="http://schemas.openxmlformats.org/presentationml/2006/main">
   <p:cSld>
     <p:spTree>
@@ -6634,6 +5864,265 @@
     <p:extLst>
       <p:ext uri="{BB962C8B-B14F-4D97-AF65-F5344CB8AC3E}">
         <p14:creationId xmlns:p14="http://schemas.microsoft.com/office/powerpoint/2010/main" val="901590933"/>
+      </p:ext>
+    </p:extLst>
+  </p:cSld>
+  <p:clrMapOvr>
+    <a:masterClrMapping/>
+  </p:clrMapOvr>
+</p:sld>
+</file>
+
+<file path=ppt/slides/slide9.xml><?xml version="1.0" encoding="utf-8"?>
+<p:sld xmlns:a="http://schemas.openxmlformats.org/drawingml/2006/main" xmlns:r="http://schemas.openxmlformats.org/officeDocument/2006/relationships" xmlns:p="http://schemas.openxmlformats.org/presentationml/2006/main">
+  <p:cSld>
+    <p:spTree>
+      <p:nvGrpSpPr>
+        <p:cNvPr id="1" name=""/>
+        <p:cNvGrpSpPr/>
+        <p:nvPr/>
+      </p:nvGrpSpPr>
+      <p:grpSpPr>
+        <a:xfrm>
+          <a:off x="0" y="0"/>
+          <a:ext cx="0" cy="0"/>
+          <a:chOff x="0" y="0"/>
+          <a:chExt cx="0" cy="0"/>
+        </a:xfrm>
+      </p:grpSpPr>
+      <p:sp>
+        <p:nvSpPr>
+          <p:cNvPr id="4" name="TextBox 3"/>
+          <p:cNvSpPr txBox="1"/>
+          <p:nvPr/>
+        </p:nvSpPr>
+        <p:spPr>
+          <a:xfrm>
+            <a:off x="5404176" y="2968131"/>
+            <a:ext cx="1383647" cy="707886"/>
+          </a:xfrm>
+          <a:prstGeom prst="rect">
+            <a:avLst/>
+          </a:prstGeom>
+          <a:noFill/>
+        </p:spPr>
+        <p:txBody>
+          <a:bodyPr wrap="square" rtlCol="0">
+            <a:spAutoFit/>
+          </a:bodyPr>
+          <a:lstStyle/>
+          <a:p>
+            <a:r>
+              <a:rPr lang="zh-CN" altLang="en-US" sz="4000" dirty="0"/>
+              <a:t>结束</a:t>
+            </a:r>
+            <a:endParaRPr lang="en-US" sz="4000" dirty="0"/>
+          </a:p>
+        </p:txBody>
+      </p:sp>
+      <p:sp>
+        <p:nvSpPr>
+          <p:cNvPr id="3" name="内容占位符 2">
+            <a:extLst>
+              <a:ext uri="{FF2B5EF4-FFF2-40B4-BE49-F238E27FC236}">
+                <a16:creationId xmlns:a16="http://schemas.microsoft.com/office/drawing/2014/main" id="{F1ADDDE5-B409-4009-A8DB-6FBC8EF44666}"/>
+              </a:ext>
+            </a:extLst>
+          </p:cNvPr>
+          <p:cNvSpPr>
+            <a:spLocks noGrp="1"/>
+          </p:cNvSpPr>
+          <p:nvPr/>
+        </p:nvSpPr>
+        <p:spPr>
+          <a:xfrm>
+            <a:off x="577128" y="1564416"/>
+            <a:ext cx="10763317" cy="1602990"/>
+          </a:xfrm>
+          <a:prstGeom prst="rect">
+            <a:avLst/>
+          </a:prstGeom>
+        </p:spPr>
+        <p:txBody>
+          <a:bodyPr vert="horz" lIns="91440" tIns="45720" rIns="91440" bIns="45720" rtlCol="0">
+            <a:normAutofit/>
+          </a:bodyPr>
+          <a:lstStyle>
+            <a:lvl1pPr marL="228600" indent="-228600" algn="l" defTabSz="914400" rtl="0" eaLnBrk="1" latinLnBrk="0" hangingPunct="1">
+              <a:lnSpc>
+                <a:spcPct val="90000"/>
+              </a:lnSpc>
+              <a:spcBef>
+                <a:spcPts val="1000"/>
+              </a:spcBef>
+              <a:buFont typeface="Arial" panose="020B0604020202020204" pitchFamily="34" charset="0"/>
+              <a:buChar char="•"/>
+              <a:defRPr sz="2800" kern="1200">
+                <a:solidFill>
+                  <a:schemeClr val="tx1"/>
+                </a:solidFill>
+                <a:latin typeface="+mn-lt"/>
+                <a:ea typeface="+mn-ea"/>
+                <a:cs typeface="+mn-cs"/>
+              </a:defRPr>
+            </a:lvl1pPr>
+            <a:lvl2pPr marL="685800" indent="-228600" algn="l" defTabSz="914400" rtl="0" eaLnBrk="1" latinLnBrk="0" hangingPunct="1">
+              <a:lnSpc>
+                <a:spcPct val="90000"/>
+              </a:lnSpc>
+              <a:spcBef>
+                <a:spcPts val="500"/>
+              </a:spcBef>
+              <a:buFont typeface="Arial" panose="020B0604020202020204" pitchFamily="34" charset="0"/>
+              <a:buChar char="•"/>
+              <a:defRPr sz="2400" kern="1200">
+                <a:solidFill>
+                  <a:schemeClr val="tx1"/>
+                </a:solidFill>
+                <a:latin typeface="+mn-lt"/>
+                <a:ea typeface="+mn-ea"/>
+                <a:cs typeface="+mn-cs"/>
+              </a:defRPr>
+            </a:lvl2pPr>
+            <a:lvl3pPr marL="1143000" indent="-228600" algn="l" defTabSz="914400" rtl="0" eaLnBrk="1" latinLnBrk="0" hangingPunct="1">
+              <a:lnSpc>
+                <a:spcPct val="90000"/>
+              </a:lnSpc>
+              <a:spcBef>
+                <a:spcPts val="500"/>
+              </a:spcBef>
+              <a:buFont typeface="Arial" panose="020B0604020202020204" pitchFamily="34" charset="0"/>
+              <a:buChar char="•"/>
+              <a:defRPr sz="2000" kern="1200">
+                <a:solidFill>
+                  <a:schemeClr val="tx1"/>
+                </a:solidFill>
+                <a:latin typeface="+mn-lt"/>
+                <a:ea typeface="+mn-ea"/>
+                <a:cs typeface="+mn-cs"/>
+              </a:defRPr>
+            </a:lvl3pPr>
+            <a:lvl4pPr marL="1600200" indent="-228600" algn="l" defTabSz="914400" rtl="0" eaLnBrk="1" latinLnBrk="0" hangingPunct="1">
+              <a:lnSpc>
+                <a:spcPct val="90000"/>
+              </a:lnSpc>
+              <a:spcBef>
+                <a:spcPts val="500"/>
+              </a:spcBef>
+              <a:buFont typeface="Arial" panose="020B0604020202020204" pitchFamily="34" charset="0"/>
+              <a:buChar char="•"/>
+              <a:defRPr sz="1800" kern="1200">
+                <a:solidFill>
+                  <a:schemeClr val="tx1"/>
+                </a:solidFill>
+                <a:latin typeface="+mn-lt"/>
+                <a:ea typeface="+mn-ea"/>
+                <a:cs typeface="+mn-cs"/>
+              </a:defRPr>
+            </a:lvl4pPr>
+            <a:lvl5pPr marL="2057400" indent="-228600" algn="l" defTabSz="914400" rtl="0" eaLnBrk="1" latinLnBrk="0" hangingPunct="1">
+              <a:lnSpc>
+                <a:spcPct val="90000"/>
+              </a:lnSpc>
+              <a:spcBef>
+                <a:spcPts val="500"/>
+              </a:spcBef>
+              <a:buFont typeface="Arial" panose="020B0604020202020204" pitchFamily="34" charset="0"/>
+              <a:buChar char="•"/>
+              <a:defRPr sz="1800" kern="1200">
+                <a:solidFill>
+                  <a:schemeClr val="tx1"/>
+                </a:solidFill>
+                <a:latin typeface="+mn-lt"/>
+                <a:ea typeface="+mn-ea"/>
+                <a:cs typeface="+mn-cs"/>
+              </a:defRPr>
+            </a:lvl5pPr>
+            <a:lvl6pPr marL="2514600" indent="-228600" algn="l" defTabSz="914400" rtl="0" eaLnBrk="1" latinLnBrk="0" hangingPunct="1">
+              <a:lnSpc>
+                <a:spcPct val="90000"/>
+              </a:lnSpc>
+              <a:spcBef>
+                <a:spcPts val="500"/>
+              </a:spcBef>
+              <a:buFont typeface="Arial" panose="020B0604020202020204" pitchFamily="34" charset="0"/>
+              <a:buChar char="•"/>
+              <a:defRPr sz="1800" kern="1200">
+                <a:solidFill>
+                  <a:schemeClr val="tx1"/>
+                </a:solidFill>
+                <a:latin typeface="+mn-lt"/>
+                <a:ea typeface="+mn-ea"/>
+                <a:cs typeface="+mn-cs"/>
+              </a:defRPr>
+            </a:lvl6pPr>
+            <a:lvl7pPr marL="2971800" indent="-228600" algn="l" defTabSz="914400" rtl="0" eaLnBrk="1" latinLnBrk="0" hangingPunct="1">
+              <a:lnSpc>
+                <a:spcPct val="90000"/>
+              </a:lnSpc>
+              <a:spcBef>
+                <a:spcPts val="500"/>
+              </a:spcBef>
+              <a:buFont typeface="Arial" panose="020B0604020202020204" pitchFamily="34" charset="0"/>
+              <a:buChar char="•"/>
+              <a:defRPr sz="1800" kern="1200">
+                <a:solidFill>
+                  <a:schemeClr val="tx1"/>
+                </a:solidFill>
+                <a:latin typeface="+mn-lt"/>
+                <a:ea typeface="+mn-ea"/>
+                <a:cs typeface="+mn-cs"/>
+              </a:defRPr>
+            </a:lvl7pPr>
+            <a:lvl8pPr marL="3429000" indent="-228600" algn="l" defTabSz="914400" rtl="0" eaLnBrk="1" latinLnBrk="0" hangingPunct="1">
+              <a:lnSpc>
+                <a:spcPct val="90000"/>
+              </a:lnSpc>
+              <a:spcBef>
+                <a:spcPts val="500"/>
+              </a:spcBef>
+              <a:buFont typeface="Arial" panose="020B0604020202020204" pitchFamily="34" charset="0"/>
+              <a:buChar char="•"/>
+              <a:defRPr sz="1800" kern="1200">
+                <a:solidFill>
+                  <a:schemeClr val="tx1"/>
+                </a:solidFill>
+                <a:latin typeface="+mn-lt"/>
+                <a:ea typeface="+mn-ea"/>
+                <a:cs typeface="+mn-cs"/>
+              </a:defRPr>
+            </a:lvl8pPr>
+            <a:lvl9pPr marL="3886200" indent="-228600" algn="l" defTabSz="914400" rtl="0" eaLnBrk="1" latinLnBrk="0" hangingPunct="1">
+              <a:lnSpc>
+                <a:spcPct val="90000"/>
+              </a:lnSpc>
+              <a:spcBef>
+                <a:spcPts val="500"/>
+              </a:spcBef>
+              <a:buFont typeface="Arial" panose="020B0604020202020204" pitchFamily="34" charset="0"/>
+              <a:buChar char="•"/>
+              <a:defRPr sz="1800" kern="1200">
+                <a:solidFill>
+                  <a:schemeClr val="tx1"/>
+                </a:solidFill>
+                <a:latin typeface="+mn-lt"/>
+                <a:ea typeface="+mn-ea"/>
+                <a:cs typeface="+mn-cs"/>
+              </a:defRPr>
+            </a:lvl9pPr>
+          </a:lstStyle>
+          <a:p>
+            <a:pPr marL="0" indent="0">
+              <a:buNone/>
+            </a:pPr>
+            <a:endParaRPr lang="zh-CN" altLang="en-US" dirty="0"/>
+          </a:p>
+        </p:txBody>
+      </p:sp>
+    </p:spTree>
+    <p:extLst>
+      <p:ext uri="{BB962C8B-B14F-4D97-AF65-F5344CB8AC3E}">
+        <p14:creationId xmlns:p14="http://schemas.microsoft.com/office/powerpoint/2010/main" val="2388827689"/>
       </p:ext>
     </p:extLst>
   </p:cSld>
@@ -6902,4 +6391,299 @@
     </a:ext>
   </a:extLst>
 </a:theme>
+</file>
+
+<file path=ppt/theme/theme2.xml><?xml version="1.0" encoding="utf-8"?>
+<a:theme xmlns:a="http://schemas.openxmlformats.org/drawingml/2006/main" name="Office 主题​​">
+  <a:themeElements>
+    <a:clrScheme name="Office">
+      <a:dk1>
+        <a:sysClr val="windowText" lastClr="000000"/>
+      </a:dk1>
+      <a:lt1>
+        <a:sysClr val="window" lastClr="FFFFFF"/>
+      </a:lt1>
+      <a:dk2>
+        <a:srgbClr val="44546A"/>
+      </a:dk2>
+      <a:lt2>
+        <a:srgbClr val="E7E6E6"/>
+      </a:lt2>
+      <a:accent1>
+        <a:srgbClr val="4472C4"/>
+      </a:accent1>
+      <a:accent2>
+        <a:srgbClr val="ED7D31"/>
+      </a:accent2>
+      <a:accent3>
+        <a:srgbClr val="A5A5A5"/>
+      </a:accent3>
+      <a:accent4>
+        <a:srgbClr val="FFC000"/>
+      </a:accent4>
+      <a:accent5>
+        <a:srgbClr val="5B9BD5"/>
+      </a:accent5>
+      <a:accent6>
+        <a:srgbClr val="70AD47"/>
+      </a:accent6>
+      <a:hlink>
+        <a:srgbClr val="0563C1"/>
+      </a:hlink>
+      <a:folHlink>
+        <a:srgbClr val="954F72"/>
+      </a:folHlink>
+    </a:clrScheme>
+    <a:fontScheme name="Office">
+      <a:majorFont>
+        <a:latin typeface="等线 Light" panose="020F0302020204030204"/>
+        <a:ea typeface=""/>
+        <a:cs typeface=""/>
+        <a:font script="Jpan" typeface="游ゴシック Light"/>
+        <a:font script="Hang" typeface="맑은 고딕"/>
+        <a:font script="Hans" typeface="等线 Light"/>
+        <a:font script="Hant" typeface="新細明體"/>
+        <a:font script="Arab" typeface="Times New Roman"/>
+        <a:font script="Hebr" typeface="Times New Roman"/>
+        <a:font script="Thai" typeface="Angsana New"/>
+        <a:font script="Ethi" typeface="Nyala"/>
+        <a:font script="Beng" typeface="Vrinda"/>
+        <a:font script="Gujr" typeface="Shruti"/>
+        <a:font script="Khmr" typeface="MoolBoran"/>
+        <a:font script="Knda" typeface="Tunga"/>
+        <a:font script="Guru" typeface="Raavi"/>
+        <a:font script="Cans" typeface="Euphemia"/>
+        <a:font script="Cher" typeface="Plantagenet Cherokee"/>
+        <a:font script="Yiii" typeface="Microsoft Yi Baiti"/>
+        <a:font script="Tibt" typeface="Microsoft Himalaya"/>
+        <a:font script="Thaa" typeface="MV Boli"/>
+        <a:font script="Deva" typeface="Mangal"/>
+        <a:font script="Telu" typeface="Gautami"/>
+        <a:font script="Taml" typeface="Latha"/>
+        <a:font script="Syrc" typeface="Estrangelo Edessa"/>
+        <a:font script="Orya" typeface="Kalinga"/>
+        <a:font script="Mlym" typeface="Kartika"/>
+        <a:font script="Laoo" typeface="DokChampa"/>
+        <a:font script="Sinh" typeface="Iskoola Pota"/>
+        <a:font script="Mong" typeface="Mongolian Baiti"/>
+        <a:font script="Viet" typeface="Times New Roman"/>
+        <a:font script="Uigh" typeface="Microsoft Uighur"/>
+        <a:font script="Geor" typeface="Sylfaen"/>
+        <a:font script="Armn" typeface="Arial"/>
+        <a:font script="Bugi" typeface="Leelawadee UI"/>
+        <a:font script="Bopo" typeface="Microsoft JhengHei"/>
+        <a:font script="Java" typeface="Javanese Text"/>
+        <a:font script="Lisu" typeface="Segoe UI"/>
+        <a:font script="Mymr" typeface="Myanmar Text"/>
+        <a:font script="Nkoo" typeface="Ebrima"/>
+        <a:font script="Olck" typeface="Nirmala UI"/>
+        <a:font script="Osma" typeface="Ebrima"/>
+        <a:font script="Phag" typeface="Phagspa"/>
+        <a:font script="Syrn" typeface="Estrangelo Edessa"/>
+        <a:font script="Syrj" typeface="Estrangelo Edessa"/>
+        <a:font script="Syre" typeface="Estrangelo Edessa"/>
+        <a:font script="Sora" typeface="Nirmala UI"/>
+        <a:font script="Tale" typeface="Microsoft Tai Le"/>
+        <a:font script="Talu" typeface="Microsoft New Tai Lue"/>
+        <a:font script="Tfng" typeface="Ebrima"/>
+      </a:majorFont>
+      <a:minorFont>
+        <a:latin typeface="等线" panose="020F0502020204030204"/>
+        <a:ea typeface=""/>
+        <a:cs typeface=""/>
+        <a:font script="Jpan" typeface="游ゴシック"/>
+        <a:font script="Hang" typeface="맑은 고딕"/>
+        <a:font script="Hans" typeface="等线"/>
+        <a:font script="Hant" typeface="新細明體"/>
+        <a:font script="Arab" typeface="Arial"/>
+        <a:font script="Hebr" typeface="Arial"/>
+        <a:font script="Thai" typeface="Cordia New"/>
+        <a:font script="Ethi" typeface="Nyala"/>
+        <a:font script="Beng" typeface="Vrinda"/>
+        <a:font script="Gujr" typeface="Shruti"/>
+        <a:font script="Khmr" typeface="DaunPenh"/>
+        <a:font script="Knda" typeface="Tunga"/>
+        <a:font script="Guru" typeface="Raavi"/>
+        <a:font script="Cans" typeface="Euphemia"/>
+        <a:font script="Cher" typeface="Plantagenet Cherokee"/>
+        <a:font script="Yiii" typeface="Microsoft Yi Baiti"/>
+        <a:font script="Tibt" typeface="Microsoft Himalaya"/>
+        <a:font script="Thaa" typeface="MV Boli"/>
+        <a:font script="Deva" typeface="Mangal"/>
+        <a:font script="Telu" typeface="Gautami"/>
+        <a:font script="Taml" typeface="Latha"/>
+        <a:font script="Syrc" typeface="Estrangelo Edessa"/>
+        <a:font script="Orya" typeface="Kalinga"/>
+        <a:font script="Mlym" typeface="Kartika"/>
+        <a:font script="Laoo" typeface="DokChampa"/>
+        <a:font script="Sinh" typeface="Iskoola Pota"/>
+        <a:font script="Mong" typeface="Mongolian Baiti"/>
+        <a:font script="Viet" typeface="Arial"/>
+        <a:font script="Uigh" typeface="Microsoft Uighur"/>
+        <a:font script="Geor" typeface="Sylfaen"/>
+        <a:font script="Armn" typeface="Arial"/>
+        <a:font script="Bugi" typeface="Leelawadee UI"/>
+        <a:font script="Bopo" typeface="Microsoft JhengHei"/>
+        <a:font script="Java" typeface="Javanese Text"/>
+        <a:font script="Lisu" typeface="Segoe UI"/>
+        <a:font script="Mymr" typeface="Myanmar Text"/>
+        <a:font script="Nkoo" typeface="Ebrima"/>
+        <a:font script="Olck" typeface="Nirmala UI"/>
+        <a:font script="Osma" typeface="Ebrima"/>
+        <a:font script="Phag" typeface="Phagspa"/>
+        <a:font script="Syrn" typeface="Estrangelo Edessa"/>
+        <a:font script="Syrj" typeface="Estrangelo Edessa"/>
+        <a:font script="Syre" typeface="Estrangelo Edessa"/>
+        <a:font script="Sora" typeface="Nirmala UI"/>
+        <a:font script="Tale" typeface="Microsoft Tai Le"/>
+        <a:font script="Talu" typeface="Microsoft New Tai Lue"/>
+        <a:font script="Tfng" typeface="Ebrima"/>
+      </a:minorFont>
+    </a:fontScheme>
+    <a:fmtScheme name="Office">
+      <a:fillStyleLst>
+        <a:solidFill>
+          <a:schemeClr val="phClr"/>
+        </a:solidFill>
+        <a:gradFill rotWithShape="1">
+          <a:gsLst>
+            <a:gs pos="0">
+              <a:schemeClr val="phClr">
+                <a:lumMod val="110000"/>
+                <a:satMod val="105000"/>
+                <a:tint val="67000"/>
+              </a:schemeClr>
+            </a:gs>
+            <a:gs pos="50000">
+              <a:schemeClr val="phClr">
+                <a:lumMod val="105000"/>
+                <a:satMod val="103000"/>
+                <a:tint val="73000"/>
+              </a:schemeClr>
+            </a:gs>
+            <a:gs pos="100000">
+              <a:schemeClr val="phClr">
+                <a:lumMod val="105000"/>
+                <a:satMod val="109000"/>
+                <a:tint val="81000"/>
+              </a:schemeClr>
+            </a:gs>
+          </a:gsLst>
+          <a:lin ang="5400000" scaled="0"/>
+        </a:gradFill>
+        <a:gradFill rotWithShape="1">
+          <a:gsLst>
+            <a:gs pos="0">
+              <a:schemeClr val="phClr">
+                <a:satMod val="103000"/>
+                <a:lumMod val="102000"/>
+                <a:tint val="94000"/>
+              </a:schemeClr>
+            </a:gs>
+            <a:gs pos="50000">
+              <a:schemeClr val="phClr">
+                <a:satMod val="110000"/>
+                <a:lumMod val="100000"/>
+                <a:shade val="100000"/>
+              </a:schemeClr>
+            </a:gs>
+            <a:gs pos="100000">
+              <a:schemeClr val="phClr">
+                <a:lumMod val="99000"/>
+                <a:satMod val="120000"/>
+                <a:shade val="78000"/>
+              </a:schemeClr>
+            </a:gs>
+          </a:gsLst>
+          <a:lin ang="5400000" scaled="0"/>
+        </a:gradFill>
+      </a:fillStyleLst>
+      <a:lnStyleLst>
+        <a:ln w="6350" cap="flat" cmpd="sng" algn="ctr">
+          <a:solidFill>
+            <a:schemeClr val="phClr"/>
+          </a:solidFill>
+          <a:prstDash val="solid"/>
+          <a:miter lim="800000"/>
+        </a:ln>
+        <a:ln w="12700" cap="flat" cmpd="sng" algn="ctr">
+          <a:solidFill>
+            <a:schemeClr val="phClr"/>
+          </a:solidFill>
+          <a:prstDash val="solid"/>
+          <a:miter lim="800000"/>
+        </a:ln>
+        <a:ln w="19050" cap="flat" cmpd="sng" algn="ctr">
+          <a:solidFill>
+            <a:schemeClr val="phClr"/>
+          </a:solidFill>
+          <a:prstDash val="solid"/>
+          <a:miter lim="800000"/>
+        </a:ln>
+      </a:lnStyleLst>
+      <a:effectStyleLst>
+        <a:effectStyle>
+          <a:effectLst/>
+        </a:effectStyle>
+        <a:effectStyle>
+          <a:effectLst/>
+        </a:effectStyle>
+        <a:effectStyle>
+          <a:effectLst>
+            <a:outerShdw blurRad="57150" dist="19050" dir="5400000" algn="ctr" rotWithShape="0">
+              <a:srgbClr val="000000">
+                <a:alpha val="63000"/>
+              </a:srgbClr>
+            </a:outerShdw>
+          </a:effectLst>
+        </a:effectStyle>
+      </a:effectStyleLst>
+      <a:bgFillStyleLst>
+        <a:solidFill>
+          <a:schemeClr val="phClr"/>
+        </a:solidFill>
+        <a:solidFill>
+          <a:schemeClr val="phClr">
+            <a:tint val="95000"/>
+            <a:satMod val="170000"/>
+          </a:schemeClr>
+        </a:solidFill>
+        <a:gradFill rotWithShape="1">
+          <a:gsLst>
+            <a:gs pos="0">
+              <a:schemeClr val="phClr">
+                <a:tint val="93000"/>
+                <a:satMod val="150000"/>
+                <a:shade val="98000"/>
+                <a:lumMod val="102000"/>
+              </a:schemeClr>
+            </a:gs>
+            <a:gs pos="50000">
+              <a:schemeClr val="phClr">
+                <a:tint val="98000"/>
+                <a:satMod val="130000"/>
+                <a:shade val="90000"/>
+                <a:lumMod val="103000"/>
+              </a:schemeClr>
+            </a:gs>
+            <a:gs pos="100000">
+              <a:schemeClr val="phClr">
+                <a:shade val="63000"/>
+                <a:satMod val="120000"/>
+              </a:schemeClr>
+            </a:gs>
+          </a:gsLst>
+          <a:lin ang="5400000" scaled="0"/>
+        </a:gradFill>
+      </a:bgFillStyleLst>
+    </a:fmtScheme>
+  </a:themeElements>
+  <a:objectDefaults/>
+  <a:extraClrSchemeLst/>
+  <a:extLst>
+    <a:ext uri="{05A4C25C-085E-4340-85A3-A5531E510DB2}">
+      <thm15:themeFamily xmlns:thm15="http://schemas.microsoft.com/office/thememl/2012/main" name="Office Theme" id="{62F939B6-93AF-4DB8-9C6B-D6C7DFDC589F}" vid="{4A3C46E8-61CC-4603-A589-7422A47A8E4A}"/>
+    </a:ext>
+  </a:extLst>
+</a:theme>
 </file>
</xml_diff>